<commit_message>
Closing and Eric slides
</commit_message>
<xml_diff>
--- a/Slides/Eric Regnier - Unify your data with CDS - 300 GPPB Wellington.pptx
+++ b/Slides/Eric Regnier - Unify your data with CDS - 300 GPPB Wellington.pptx
@@ -2,16 +2,23 @@
 <file path=ppt/presentation.xml><?xml version="1.0" encoding="utf-8"?>
 <p:presentation xmlns:a="http://schemas.openxmlformats.org/drawingml/2006/main" xmlns:r="http://schemas.openxmlformats.org/officeDocument/2006/relationships" xmlns:p="http://schemas.openxmlformats.org/presentationml/2006/main" saveSubsetFonts="1">
   <p:sldMasterIdLst>
-    <p:sldMasterId id="2147483697" r:id="rId1"/>
+    <p:sldMasterId id="2147483697" r:id="rId4"/>
   </p:sldMasterIdLst>
   <p:notesMasterIdLst>
-    <p:notesMasterId r:id="rId6"/>
+    <p:notesMasterId r:id="rId16"/>
   </p:notesMasterIdLst>
   <p:sldIdLst>
-    <p:sldId id="275" r:id="rId2"/>
-    <p:sldId id="276" r:id="rId3"/>
-    <p:sldId id="277" r:id="rId4"/>
-    <p:sldId id="259" r:id="rId5"/>
+    <p:sldId id="275" r:id="rId5"/>
+    <p:sldId id="278" r:id="rId6"/>
+    <p:sldId id="279" r:id="rId7"/>
+    <p:sldId id="280" r:id="rId8"/>
+    <p:sldId id="304" r:id="rId9"/>
+    <p:sldId id="297" r:id="rId10"/>
+    <p:sldId id="299" r:id="rId11"/>
+    <p:sldId id="300" r:id="rId12"/>
+    <p:sldId id="302" r:id="rId13"/>
+    <p:sldId id="303" r:id="rId14"/>
+    <p:sldId id="259" r:id="rId15"/>
   </p:sldIdLst>
   <p:sldSz cx="12192000" cy="6858000"/>
   <p:notesSz cx="6858000" cy="9144000"/>
@@ -130,6 +137,14 @@
 </p:cmAuthorLst>
 </file>
 
+<file path=ppt/revisionInfo.xml><?xml version="1.0" encoding="utf-8"?>
+<p1510:revInfo xmlns:a="http://schemas.openxmlformats.org/drawingml/2006/main" xmlns:r="http://schemas.openxmlformats.org/officeDocument/2006/relationships" xmlns:p1510="http://schemas.microsoft.com/office/powerpoint/2015/10/main">
+  <p1510:revLst>
+    <p1510:client id="{2096FB52-6C72-43A2-A454-2B75FF1A24BD}" v="28" dt="2020-02-13T07:09:30.911"/>
+  </p1510:revLst>
+</p1510:revInfo>
+</file>
+
 <file path=ppt/notesMasters/notesMaster1.xml><?xml version="1.0" encoding="utf-8"?>
 <p:notesMaster xmlns:a="http://schemas.openxmlformats.org/drawingml/2006/main" xmlns:r="http://schemas.openxmlformats.org/officeDocument/2006/relationships" xmlns:p="http://schemas.openxmlformats.org/presentationml/2006/main">
   <p:cSld>
@@ -212,7 +227,7 @@
           <a:p>
             <a:fld id="{92E7C815-ED2C-4A30-8899-DEAAFD1DFCC4}" type="datetimeFigureOut">
               <a:rPr lang="en-AU" smtClean="0"/>
-              <a:t>8/02/2020</a:t>
+              <a:t>14/02/2020</a:t>
             </a:fld>
             <a:endParaRPr lang="en-AU"/>
           </a:p>
@@ -708,7 +723,7 @@
           <a:p>
             <a:fld id="{05F35E56-A3D2-45D8-BB04-21DD29FB9D02}" type="datetimeFigureOut">
               <a:rPr lang="en-AU" smtClean="0"/>
-              <a:t>8/02/2020</a:t>
+              <a:t>14/02/2020</a:t>
             </a:fld>
             <a:endParaRPr lang="en-AU"/>
           </a:p>
@@ -878,7 +893,7 @@
           <a:p>
             <a:fld id="{05F35E56-A3D2-45D8-BB04-21DD29FB9D02}" type="datetimeFigureOut">
               <a:rPr lang="en-AU" smtClean="0"/>
-              <a:t>8/02/2020</a:t>
+              <a:t>14/02/2020</a:t>
             </a:fld>
             <a:endParaRPr lang="en-AU"/>
           </a:p>
@@ -1058,7 +1073,7 @@
           <a:p>
             <a:fld id="{05F35E56-A3D2-45D8-BB04-21DD29FB9D02}" type="datetimeFigureOut">
               <a:rPr lang="en-AU" smtClean="0"/>
-              <a:t>8/02/2020</a:t>
+              <a:t>14/02/2020</a:t>
             </a:fld>
             <a:endParaRPr lang="en-AU"/>
           </a:p>
@@ -1384,7 +1399,7 @@
           <a:p>
             <a:fld id="{05F35E56-A3D2-45D8-BB04-21DD29FB9D02}" type="datetimeFigureOut">
               <a:rPr lang="en-AU" smtClean="0"/>
-              <a:t>8/02/2020</a:t>
+              <a:t>14/02/2020</a:t>
             </a:fld>
             <a:endParaRPr lang="en-AU"/>
           </a:p>
@@ -1630,7 +1645,7 @@
           <a:p>
             <a:fld id="{05F35E56-A3D2-45D8-BB04-21DD29FB9D02}" type="datetimeFigureOut">
               <a:rPr lang="en-AU" smtClean="0"/>
-              <a:t>8/02/2020</a:t>
+              <a:t>14/02/2020</a:t>
             </a:fld>
             <a:endParaRPr lang="en-AU"/>
           </a:p>
@@ -1862,7 +1877,7 @@
           <a:p>
             <a:fld id="{05F35E56-A3D2-45D8-BB04-21DD29FB9D02}" type="datetimeFigureOut">
               <a:rPr lang="en-AU" smtClean="0"/>
-              <a:t>8/02/2020</a:t>
+              <a:t>14/02/2020</a:t>
             </a:fld>
             <a:endParaRPr lang="en-AU"/>
           </a:p>
@@ -2229,7 +2244,7 @@
           <a:p>
             <a:fld id="{05F35E56-A3D2-45D8-BB04-21DD29FB9D02}" type="datetimeFigureOut">
               <a:rPr lang="en-AU" smtClean="0"/>
-              <a:t>8/02/2020</a:t>
+              <a:t>14/02/2020</a:t>
             </a:fld>
             <a:endParaRPr lang="en-AU"/>
           </a:p>
@@ -2347,7 +2362,7 @@
           <a:p>
             <a:fld id="{05F35E56-A3D2-45D8-BB04-21DD29FB9D02}" type="datetimeFigureOut">
               <a:rPr lang="en-AU" smtClean="0"/>
-              <a:t>8/02/2020</a:t>
+              <a:t>14/02/2020</a:t>
             </a:fld>
             <a:endParaRPr lang="en-AU"/>
           </a:p>
@@ -2442,7 +2457,7 @@
           <a:p>
             <a:fld id="{05F35E56-A3D2-45D8-BB04-21DD29FB9D02}" type="datetimeFigureOut">
               <a:rPr lang="en-AU" smtClean="0"/>
-              <a:t>8/02/2020</a:t>
+              <a:t>14/02/2020</a:t>
             </a:fld>
             <a:endParaRPr lang="en-AU"/>
           </a:p>
@@ -2719,7 +2734,7 @@
           <a:p>
             <a:fld id="{05F35E56-A3D2-45D8-BB04-21DD29FB9D02}" type="datetimeFigureOut">
               <a:rPr lang="en-AU" smtClean="0"/>
-              <a:t>8/02/2020</a:t>
+              <a:t>14/02/2020</a:t>
             </a:fld>
             <a:endParaRPr lang="en-AU"/>
           </a:p>
@@ -2976,7 +2991,7 @@
           <a:p>
             <a:fld id="{05F35E56-A3D2-45D8-BB04-21DD29FB9D02}" type="datetimeFigureOut">
               <a:rPr lang="en-AU" smtClean="0"/>
-              <a:t>8/02/2020</a:t>
+              <a:t>14/02/2020</a:t>
             </a:fld>
             <a:endParaRPr lang="en-AU"/>
           </a:p>
@@ -3198,7 +3213,7 @@
           <a:p>
             <a:fld id="{05F35E56-A3D2-45D8-BB04-21DD29FB9D02}" type="datetimeFigureOut">
               <a:rPr lang="en-AU" smtClean="0"/>
-              <a:t>8/02/2020</a:t>
+              <a:t>14/02/2020</a:t>
             </a:fld>
             <a:endParaRPr lang="en-AU"/>
           </a:p>
@@ -3645,21 +3660,7 @@
                 <a:latin typeface="Segoe UI Light" panose="020B0502040204020203" pitchFamily="34" charset="0"/>
                 <a:cs typeface="Segoe UI Light" panose="020B0502040204020203" pitchFamily="34" charset="0"/>
               </a:rPr>
-              <a:t>Unify </a:t>
-            </a:r>
-            <a:r>
-              <a:rPr lang="en-US" sz="3600">
-                <a:latin typeface="Segoe UI Light" panose="020B0502040204020203" pitchFamily="34" charset="0"/>
-                <a:cs typeface="Segoe UI Light" panose="020B0502040204020203" pitchFamily="34" charset="0"/>
-              </a:rPr>
-              <a:t>your Data with </a:t>
-            </a:r>
-            <a:r>
-              <a:rPr lang="en-US" sz="3600" dirty="0">
-                <a:latin typeface="Segoe UI Light" panose="020B0502040204020203" pitchFamily="34" charset="0"/>
-                <a:cs typeface="Segoe UI Light" panose="020B0502040204020203" pitchFamily="34" charset="0"/>
-              </a:rPr>
-              <a:t>CDS</a:t>
+              <a:t>Unify your data with CDS</a:t>
             </a:r>
             <a:endParaRPr lang="en-AU" sz="3600" dirty="0">
               <a:latin typeface="Segoe UI Light" panose="020B0502040204020203" pitchFamily="34" charset="0"/>
@@ -3695,26 +3696,15 @@
           <a:lstStyle/>
           <a:p>
             <a:r>
-              <a:rPr lang="en-US" dirty="0">
-                <a:latin typeface="Segoe UI Light" panose="020B0502040204020203" pitchFamily="34" charset="0"/>
-                <a:cs typeface="Segoe UI Light" panose="020B0502040204020203" pitchFamily="34" charset="0"/>
+              <a:rPr lang="en-AU" dirty="0">
+                <a:solidFill>
+                  <a:srgbClr val="0070C0"/>
+                </a:solidFill>
+                <a:latin typeface="Segoe UI" panose="020B0502040204020203" pitchFamily="34" charset="0"/>
+                <a:cs typeface="Segoe UI" panose="020B0502040204020203" pitchFamily="34" charset="0"/>
               </a:rPr>
-              <a:t>Eric </a:t>
-            </a:r>
-            <a:r>
-              <a:rPr lang="en-US" dirty="0" err="1">
-                <a:latin typeface="Segoe UI Light" panose="020B0502040204020203" pitchFamily="34" charset="0"/>
-                <a:cs typeface="Segoe UI Light" panose="020B0502040204020203" pitchFamily="34" charset="0"/>
-              </a:rPr>
-              <a:t>Regnier</a:t>
-            </a:r>
-            <a:endParaRPr lang="en-AU" dirty="0">
-              <a:solidFill>
-                <a:srgbClr val="0070C0"/>
-              </a:solidFill>
-              <a:latin typeface="Segoe UI" panose="020B0502040204020203" pitchFamily="34" charset="0"/>
-              <a:cs typeface="Segoe UI" panose="020B0502040204020203" pitchFamily="34" charset="0"/>
-            </a:endParaRPr>
+              <a:t>Eric Regnier</a:t>
+            </a:r>
           </a:p>
         </p:txBody>
       </p:sp>
@@ -3733,7 +3723,7 @@
         <p:spPr>
           <a:xfrm>
             <a:off x="959139" y="5031905"/>
-            <a:ext cx="2465740" cy="369332"/>
+            <a:ext cx="5487400" cy="369332"/>
           </a:xfrm>
           <a:prstGeom prst="rect">
             <a:avLst/>
@@ -3756,7 +3746,7 @@
                 <a:latin typeface="Segoe UI Light" panose="020B0502040204020203" pitchFamily="34" charset="0"/>
                 <a:cs typeface="Segoe UI Light" panose="020B0502040204020203" pitchFamily="34" charset="0"/>
               </a:rPr>
-              <a:t>Title | Product | DXC NZ</a:t>
+              <a:t>Architect &amp; Developer | Dynamics 365 &amp; CDS | DXC NZ</a:t>
             </a:r>
           </a:p>
         </p:txBody>
@@ -3846,6 +3836,475 @@
 </p:sld>
 </file>
 
+<file path=ppt/slides/slide10.xml><?xml version="1.0" encoding="utf-8"?>
+<p:sld xmlns:a="http://schemas.openxmlformats.org/drawingml/2006/main" xmlns:r="http://schemas.openxmlformats.org/officeDocument/2006/relationships" xmlns:p="http://schemas.openxmlformats.org/presentationml/2006/main">
+  <p:cSld>
+    <p:spTree>
+      <p:nvGrpSpPr>
+        <p:cNvPr id="1" name=""/>
+        <p:cNvGrpSpPr/>
+        <p:nvPr/>
+      </p:nvGrpSpPr>
+      <p:grpSpPr>
+        <a:xfrm>
+          <a:off x="0" y="0"/>
+          <a:ext cx="0" cy="0"/>
+          <a:chOff x="0" y="0"/>
+          <a:chExt cx="0" cy="0"/>
+        </a:xfrm>
+      </p:grpSpPr>
+      <p:sp>
+        <p:nvSpPr>
+          <p:cNvPr id="3" name="Title 1">
+            <a:extLst>
+              <a:ext uri="{FF2B5EF4-FFF2-40B4-BE49-F238E27FC236}">
+                <a16:creationId xmlns:a16="http://schemas.microsoft.com/office/drawing/2014/main" id="{9C900B5D-CEED-43B5-AE74-746BCAAF359C}"/>
+              </a:ext>
+            </a:extLst>
+          </p:cNvPr>
+          <p:cNvSpPr txBox="1">
+            <a:spLocks/>
+          </p:cNvSpPr>
+          <p:nvPr/>
+        </p:nvSpPr>
+        <p:spPr>
+          <a:xfrm>
+            <a:off x="687371" y="365125"/>
+            <a:ext cx="10515600" cy="1325563"/>
+          </a:xfrm>
+          <a:prstGeom prst="rect">
+            <a:avLst/>
+          </a:prstGeom>
+        </p:spPr>
+        <p:txBody>
+          <a:bodyPr/>
+          <a:lstStyle>
+            <a:lvl1pPr algn="l" defTabSz="914377" rtl="0" eaLnBrk="1" latinLnBrk="0" hangingPunct="1">
+              <a:lnSpc>
+                <a:spcPct val="90000"/>
+              </a:lnSpc>
+              <a:spcBef>
+                <a:spcPct val="0"/>
+              </a:spcBef>
+              <a:buNone/>
+              <a:defRPr sz="4400" kern="1200">
+                <a:solidFill>
+                  <a:schemeClr val="tx1"/>
+                </a:solidFill>
+                <a:latin typeface="+mj-lt"/>
+                <a:ea typeface="+mj-ea"/>
+                <a:cs typeface="+mj-cs"/>
+              </a:defRPr>
+            </a:lvl1pPr>
+          </a:lstStyle>
+          <a:p>
+            <a:r>
+              <a:rPr lang="en-NZ" dirty="0"/>
+              <a:t>Conclusion and Questions?</a:t>
+            </a:r>
+            <a:endParaRPr lang="en-US" dirty="0"/>
+          </a:p>
+        </p:txBody>
+      </p:sp>
+      <p:sp>
+        <p:nvSpPr>
+          <p:cNvPr id="4" name="Content Placeholder 2">
+            <a:extLst>
+              <a:ext uri="{FF2B5EF4-FFF2-40B4-BE49-F238E27FC236}">
+                <a16:creationId xmlns:a16="http://schemas.microsoft.com/office/drawing/2014/main" id="{DE3E16BE-ACC0-4977-A078-9326687ACDD5}"/>
+              </a:ext>
+            </a:extLst>
+          </p:cNvPr>
+          <p:cNvSpPr txBox="1">
+            <a:spLocks/>
+          </p:cNvSpPr>
+          <p:nvPr/>
+        </p:nvSpPr>
+        <p:spPr>
+          <a:xfrm>
+            <a:off x="385713" y="1690688"/>
+            <a:ext cx="6177012" cy="4351338"/>
+          </a:xfrm>
+          <a:prstGeom prst="rect">
+            <a:avLst/>
+          </a:prstGeom>
+        </p:spPr>
+        <p:txBody>
+          <a:bodyPr>
+            <a:normAutofit/>
+          </a:bodyPr>
+          <a:lstStyle>
+            <a:lvl1pPr marL="228594" indent="-228594" algn="l" defTabSz="914377" rtl="0" eaLnBrk="1" latinLnBrk="0" hangingPunct="1">
+              <a:lnSpc>
+                <a:spcPct val="90000"/>
+              </a:lnSpc>
+              <a:spcBef>
+                <a:spcPts val="1000"/>
+              </a:spcBef>
+              <a:buFont typeface="Arial" panose="020B0604020202020204" pitchFamily="34" charset="0"/>
+              <a:buChar char="•"/>
+              <a:defRPr sz="2800" kern="1200">
+                <a:solidFill>
+                  <a:schemeClr val="tx1"/>
+                </a:solidFill>
+                <a:latin typeface="+mn-lt"/>
+                <a:ea typeface="+mn-ea"/>
+                <a:cs typeface="+mn-cs"/>
+              </a:defRPr>
+            </a:lvl1pPr>
+            <a:lvl2pPr marL="685783" indent="-228594" algn="l" defTabSz="914377" rtl="0" eaLnBrk="1" latinLnBrk="0" hangingPunct="1">
+              <a:lnSpc>
+                <a:spcPct val="90000"/>
+              </a:lnSpc>
+              <a:spcBef>
+                <a:spcPts val="500"/>
+              </a:spcBef>
+              <a:buFont typeface="Arial" panose="020B0604020202020204" pitchFamily="34" charset="0"/>
+              <a:buChar char="•"/>
+              <a:defRPr sz="2400" kern="1200">
+                <a:solidFill>
+                  <a:schemeClr val="tx1"/>
+                </a:solidFill>
+                <a:latin typeface="+mn-lt"/>
+                <a:ea typeface="+mn-ea"/>
+                <a:cs typeface="+mn-cs"/>
+              </a:defRPr>
+            </a:lvl2pPr>
+            <a:lvl3pPr marL="1142971" indent="-228594" algn="l" defTabSz="914377" rtl="0" eaLnBrk="1" latinLnBrk="0" hangingPunct="1">
+              <a:lnSpc>
+                <a:spcPct val="90000"/>
+              </a:lnSpc>
+              <a:spcBef>
+                <a:spcPts val="500"/>
+              </a:spcBef>
+              <a:buFont typeface="Arial" panose="020B0604020202020204" pitchFamily="34" charset="0"/>
+              <a:buChar char="•"/>
+              <a:defRPr sz="2000" kern="1200">
+                <a:solidFill>
+                  <a:schemeClr val="tx1"/>
+                </a:solidFill>
+                <a:latin typeface="+mn-lt"/>
+                <a:ea typeface="+mn-ea"/>
+                <a:cs typeface="+mn-cs"/>
+              </a:defRPr>
+            </a:lvl3pPr>
+            <a:lvl4pPr marL="1600160" indent="-228594" algn="l" defTabSz="914377" rtl="0" eaLnBrk="1" latinLnBrk="0" hangingPunct="1">
+              <a:lnSpc>
+                <a:spcPct val="90000"/>
+              </a:lnSpc>
+              <a:spcBef>
+                <a:spcPts val="500"/>
+              </a:spcBef>
+              <a:buFont typeface="Arial" panose="020B0604020202020204" pitchFamily="34" charset="0"/>
+              <a:buChar char="•"/>
+              <a:defRPr sz="1800" kern="1200">
+                <a:solidFill>
+                  <a:schemeClr val="tx1"/>
+                </a:solidFill>
+                <a:latin typeface="+mn-lt"/>
+                <a:ea typeface="+mn-ea"/>
+                <a:cs typeface="+mn-cs"/>
+              </a:defRPr>
+            </a:lvl4pPr>
+            <a:lvl5pPr marL="2057349" indent="-228594" algn="l" defTabSz="914377" rtl="0" eaLnBrk="1" latinLnBrk="0" hangingPunct="1">
+              <a:lnSpc>
+                <a:spcPct val="90000"/>
+              </a:lnSpc>
+              <a:spcBef>
+                <a:spcPts val="500"/>
+              </a:spcBef>
+              <a:buFont typeface="Arial" panose="020B0604020202020204" pitchFamily="34" charset="0"/>
+              <a:buChar char="•"/>
+              <a:defRPr sz="1800" kern="1200">
+                <a:solidFill>
+                  <a:schemeClr val="tx1"/>
+                </a:solidFill>
+                <a:latin typeface="+mn-lt"/>
+                <a:ea typeface="+mn-ea"/>
+                <a:cs typeface="+mn-cs"/>
+              </a:defRPr>
+            </a:lvl5pPr>
+            <a:lvl6pPr marL="2514537" indent="-228594" algn="l" defTabSz="914377" rtl="0" eaLnBrk="1" latinLnBrk="0" hangingPunct="1">
+              <a:lnSpc>
+                <a:spcPct val="90000"/>
+              </a:lnSpc>
+              <a:spcBef>
+                <a:spcPts val="500"/>
+              </a:spcBef>
+              <a:buFont typeface="Arial" panose="020B0604020202020204" pitchFamily="34" charset="0"/>
+              <a:buChar char="•"/>
+              <a:defRPr sz="1800" kern="1200">
+                <a:solidFill>
+                  <a:schemeClr val="tx1"/>
+                </a:solidFill>
+                <a:latin typeface="+mn-lt"/>
+                <a:ea typeface="+mn-ea"/>
+                <a:cs typeface="+mn-cs"/>
+              </a:defRPr>
+            </a:lvl6pPr>
+            <a:lvl7pPr marL="2971726" indent="-228594" algn="l" defTabSz="914377" rtl="0" eaLnBrk="1" latinLnBrk="0" hangingPunct="1">
+              <a:lnSpc>
+                <a:spcPct val="90000"/>
+              </a:lnSpc>
+              <a:spcBef>
+                <a:spcPts val="500"/>
+              </a:spcBef>
+              <a:buFont typeface="Arial" panose="020B0604020202020204" pitchFamily="34" charset="0"/>
+              <a:buChar char="•"/>
+              <a:defRPr sz="1800" kern="1200">
+                <a:solidFill>
+                  <a:schemeClr val="tx1"/>
+                </a:solidFill>
+                <a:latin typeface="+mn-lt"/>
+                <a:ea typeface="+mn-ea"/>
+                <a:cs typeface="+mn-cs"/>
+              </a:defRPr>
+            </a:lvl7pPr>
+            <a:lvl8pPr marL="3428914" indent="-228594" algn="l" defTabSz="914377" rtl="0" eaLnBrk="1" latinLnBrk="0" hangingPunct="1">
+              <a:lnSpc>
+                <a:spcPct val="90000"/>
+              </a:lnSpc>
+              <a:spcBef>
+                <a:spcPts val="500"/>
+              </a:spcBef>
+              <a:buFont typeface="Arial" panose="020B0604020202020204" pitchFamily="34" charset="0"/>
+              <a:buChar char="•"/>
+              <a:defRPr sz="1800" kern="1200">
+                <a:solidFill>
+                  <a:schemeClr val="tx1"/>
+                </a:solidFill>
+                <a:latin typeface="+mn-lt"/>
+                <a:ea typeface="+mn-ea"/>
+                <a:cs typeface="+mn-cs"/>
+              </a:defRPr>
+            </a:lvl8pPr>
+            <a:lvl9pPr marL="3886103" indent="-228594" algn="l" defTabSz="914377" rtl="0" eaLnBrk="1" latinLnBrk="0" hangingPunct="1">
+              <a:lnSpc>
+                <a:spcPct val="90000"/>
+              </a:lnSpc>
+              <a:spcBef>
+                <a:spcPts val="500"/>
+              </a:spcBef>
+              <a:buFont typeface="Arial" panose="020B0604020202020204" pitchFamily="34" charset="0"/>
+              <a:buChar char="•"/>
+              <a:defRPr sz="1800" kern="1200">
+                <a:solidFill>
+                  <a:schemeClr val="tx1"/>
+                </a:solidFill>
+                <a:latin typeface="+mn-lt"/>
+                <a:ea typeface="+mn-ea"/>
+                <a:cs typeface="+mn-cs"/>
+              </a:defRPr>
+            </a:lvl9pPr>
+          </a:lstStyle>
+          <a:p>
+            <a:pPr marL="0" indent="0">
+              <a:buNone/>
+            </a:pPr>
+            <a:r>
+              <a:rPr lang="en-NZ" dirty="0">
+                <a:solidFill>
+                  <a:schemeClr val="accent1"/>
+                </a:solidFill>
+              </a:rPr>
+              <a:t>More info:</a:t>
+            </a:r>
+          </a:p>
+          <a:p>
+            <a:r>
+              <a:rPr lang="en-US" sz="2000" dirty="0">
+                <a:hlinkClick r:id="rId2"/>
+              </a:rPr>
+              <a:t>https://docs.microsoft.com/en-us/powerapps/maker/common-data-service/data-platform-intro</a:t>
+            </a:r>
+            <a:endParaRPr lang="en-US" sz="2000" dirty="0"/>
+          </a:p>
+          <a:p>
+            <a:endParaRPr lang="en-US" sz="2000" dirty="0">
+              <a:hlinkClick r:id="rId3"/>
+            </a:endParaRPr>
+          </a:p>
+          <a:p>
+            <a:r>
+              <a:rPr lang="en-US" sz="2000" dirty="0">
+                <a:hlinkClick r:id="rId4"/>
+              </a:rPr>
+              <a:t>https://docs.microsoft.com/en-us/powerapps/maker/common-data-service/self-service-data-prep-with-dataflows</a:t>
+            </a:r>
+            <a:endParaRPr lang="en-US" sz="2000" dirty="0"/>
+          </a:p>
+        </p:txBody>
+      </p:sp>
+      <p:pic>
+        <p:nvPicPr>
+          <p:cNvPr id="5" name="Picture 6" descr="https://i.imgflip.com/3otv54.jpg">
+            <a:extLst>
+              <a:ext uri="{FF2B5EF4-FFF2-40B4-BE49-F238E27FC236}">
+                <a16:creationId xmlns:a16="http://schemas.microsoft.com/office/drawing/2014/main" id="{631A4C02-D926-4305-83F3-35592139F0A8}"/>
+              </a:ext>
+            </a:extLst>
+          </p:cNvPr>
+          <p:cNvPicPr>
+            <a:picLocks noChangeAspect="1" noChangeArrowheads="1"/>
+          </p:cNvPicPr>
+          <p:nvPr/>
+        </p:nvPicPr>
+        <p:blipFill>
+          <a:blip r:embed="rId5">
+            <a:extLst>
+              <a:ext uri="{28A0092B-C50C-407E-A947-70E740481C1C}">
+                <a14:useLocalDpi xmlns:a14="http://schemas.microsoft.com/office/drawing/2010/main" val="0"/>
+              </a:ext>
+            </a:extLst>
+          </a:blip>
+          <a:srcRect/>
+          <a:stretch>
+            <a:fillRect/>
+          </a:stretch>
+        </p:blipFill>
+        <p:spPr bwMode="auto">
+          <a:xfrm>
+            <a:off x="6096000" y="1211713"/>
+            <a:ext cx="5033963" cy="5003939"/>
+          </a:xfrm>
+          <a:prstGeom prst="rect">
+            <a:avLst/>
+          </a:prstGeom>
+          <a:noFill/>
+          <a:extLst>
+            <a:ext uri="{909E8E84-426E-40DD-AFC4-6F175D3DCCD1}">
+              <a14:hiddenFill xmlns:a14="http://schemas.microsoft.com/office/drawing/2010/main">
+                <a:solidFill>
+                  <a:srgbClr val="FFFFFF"/>
+                </a:solidFill>
+              </a14:hiddenFill>
+            </a:ext>
+          </a:extLst>
+        </p:spPr>
+      </p:pic>
+    </p:spTree>
+    <p:extLst>
+      <p:ext uri="{BB962C8B-B14F-4D97-AF65-F5344CB8AC3E}">
+        <p14:creationId xmlns:p14="http://schemas.microsoft.com/office/powerpoint/2010/main" val="2524239965"/>
+      </p:ext>
+    </p:extLst>
+  </p:cSld>
+  <p:clrMapOvr>
+    <a:masterClrMapping/>
+  </p:clrMapOvr>
+</p:sld>
+</file>
+
+<file path=ppt/slides/slide11.xml><?xml version="1.0" encoding="utf-8"?>
+<p:sld xmlns:a="http://schemas.openxmlformats.org/drawingml/2006/main" xmlns:r="http://schemas.openxmlformats.org/officeDocument/2006/relationships" xmlns:p="http://schemas.openxmlformats.org/presentationml/2006/main">
+  <p:cSld>
+    <p:bg>
+      <p:bgPr>
+        <a:solidFill>
+          <a:schemeClr val="bg1"/>
+        </a:solidFill>
+        <a:effectLst/>
+      </p:bgPr>
+    </p:bg>
+    <p:spTree>
+      <p:nvGrpSpPr>
+        <p:cNvPr id="1" name=""/>
+        <p:cNvGrpSpPr/>
+        <p:nvPr/>
+      </p:nvGrpSpPr>
+      <p:grpSpPr>
+        <a:xfrm>
+          <a:off x="0" y="0"/>
+          <a:ext cx="0" cy="0"/>
+          <a:chOff x="0" y="0"/>
+          <a:chExt cx="0" cy="0"/>
+        </a:xfrm>
+      </p:grpSpPr>
+      <p:sp>
+        <p:nvSpPr>
+          <p:cNvPr id="2" name="Title 1">
+            <a:extLst>
+              <a:ext uri="{FF2B5EF4-FFF2-40B4-BE49-F238E27FC236}">
+                <a16:creationId xmlns:a16="http://schemas.microsoft.com/office/drawing/2014/main" id="{40B0BBAE-4C33-4034-B855-9B2814C8FA31}"/>
+              </a:ext>
+            </a:extLst>
+          </p:cNvPr>
+          <p:cNvSpPr>
+            <a:spLocks noGrp="1"/>
+          </p:cNvSpPr>
+          <p:nvPr>
+            <p:ph type="title"/>
+          </p:nvPr>
+        </p:nvSpPr>
+        <p:spPr>
+          <a:xfrm>
+            <a:off x="838200" y="227838"/>
+            <a:ext cx="10515600" cy="1325563"/>
+          </a:xfrm>
+        </p:spPr>
+        <p:txBody>
+          <a:bodyPr/>
+          <a:lstStyle/>
+          <a:p>
+            <a:pPr algn="ctr"/>
+            <a:r>
+              <a:rPr lang="en-AU" dirty="0">
+                <a:latin typeface="Segoe UI Light" panose="020B0502040204020203" pitchFamily="34" charset="0"/>
+                <a:cs typeface="Segoe UI Light" panose="020B0502040204020203" pitchFamily="34" charset="0"/>
+              </a:rPr>
+              <a:t>Thank you</a:t>
+            </a:r>
+          </a:p>
+        </p:txBody>
+      </p:sp>
+      <p:pic>
+        <p:nvPicPr>
+          <p:cNvPr id="6" name="Content Placeholder 5">
+            <a:extLst>
+              <a:ext uri="{FF2B5EF4-FFF2-40B4-BE49-F238E27FC236}">
+                <a16:creationId xmlns:a16="http://schemas.microsoft.com/office/drawing/2014/main" id="{E0E657AD-9437-4355-A8DB-6A51B690851E}"/>
+              </a:ext>
+            </a:extLst>
+          </p:cNvPr>
+          <p:cNvPicPr>
+            <a:picLocks noGrp="1" noChangeAspect="1"/>
+          </p:cNvPicPr>
+          <p:nvPr>
+            <p:ph idx="1"/>
+          </p:nvPr>
+        </p:nvPicPr>
+        <p:blipFill>
+          <a:blip r:embed="rId2">
+            <a:extLst>
+              <a:ext uri="{28A0092B-C50C-407E-A947-70E740481C1C}">
+                <a14:useLocalDpi xmlns:a14="http://schemas.microsoft.com/office/drawing/2010/main" val="0"/>
+              </a:ext>
+            </a:extLst>
+          </a:blip>
+          <a:stretch>
+            <a:fillRect/>
+          </a:stretch>
+        </p:blipFill>
+        <p:spPr>
+          <a:xfrm>
+            <a:off x="838200" y="2306224"/>
+            <a:ext cx="10515600" cy="2245551"/>
+          </a:xfrm>
+        </p:spPr>
+      </p:pic>
+    </p:spTree>
+    <p:extLst>
+      <p:ext uri="{BB962C8B-B14F-4D97-AF65-F5344CB8AC3E}">
+        <p14:creationId xmlns:p14="http://schemas.microsoft.com/office/powerpoint/2010/main" val="2925640950"/>
+      </p:ext>
+    </p:extLst>
+  </p:cSld>
+  <p:clrMapOvr>
+    <a:masterClrMapping/>
+  </p:clrMapOvr>
+</p:sld>
+</file>
+
 <file path=ppt/slides/slide2.xml><?xml version="1.0" encoding="utf-8"?>
 <p:sld xmlns:a="http://schemas.openxmlformats.org/drawingml/2006/main" xmlns:r="http://schemas.openxmlformats.org/officeDocument/2006/relationships" xmlns:p="http://schemas.openxmlformats.org/presentationml/2006/main">
   <p:cSld>
@@ -3863,37 +4322,42 @@
           <a:chExt cx="0" cy="0"/>
         </a:xfrm>
       </p:grpSpPr>
-      <p:sp>
-        <p:nvSpPr>
-          <p:cNvPr id="2" name="Title 1">
+      <p:pic>
+        <p:nvPicPr>
+          <p:cNvPr id="6" name="Picture 5">
             <a:extLst>
               <a:ext uri="{FF2B5EF4-FFF2-40B4-BE49-F238E27FC236}">
-                <a16:creationId xmlns:a16="http://schemas.microsoft.com/office/drawing/2014/main" id="{59766BB8-3838-4B30-AB6C-2941E0260C84}"/>
+                <a16:creationId xmlns:a16="http://schemas.microsoft.com/office/drawing/2014/main" id="{CD084B20-D8C4-4A50-A44A-B5947BFC6BBF}"/>
               </a:ext>
             </a:extLst>
           </p:cNvPr>
-          <p:cNvSpPr>
-            <a:spLocks noGrp="1"/>
-          </p:cNvSpPr>
-          <p:nvPr>
-            <p:ph type="title"/>
-          </p:nvPr>
-        </p:nvSpPr>
-        <p:spPr/>
-        <p:txBody>
-          <a:bodyPr/>
-          <a:lstStyle/>
-          <a:p>
-            <a:endParaRPr lang="en-NZ" dirty="0"/>
-          </a:p>
-        </p:txBody>
-      </p:sp>
-      <p:sp>
-        <p:nvSpPr>
-          <p:cNvPr id="3" name="Content Placeholder 2">
+          <p:cNvPicPr>
+            <a:picLocks noChangeAspect="1"/>
+          </p:cNvPicPr>
+          <p:nvPr/>
+        </p:nvPicPr>
+        <p:blipFill>
+          <a:blip r:embed="rId2"/>
+          <a:stretch>
+            <a:fillRect/>
+          </a:stretch>
+        </p:blipFill>
+        <p:spPr>
+          <a:xfrm>
+            <a:off x="1866508" y="1267793"/>
+            <a:ext cx="8617944" cy="4991605"/>
+          </a:xfrm>
+          <a:prstGeom prst="rect">
+            <a:avLst/>
+          </a:prstGeom>
+        </p:spPr>
+      </p:pic>
+      <p:sp>
+        <p:nvSpPr>
+          <p:cNvPr id="8" name="Title 1">
             <a:extLst>
               <a:ext uri="{FF2B5EF4-FFF2-40B4-BE49-F238E27FC236}">
-                <a16:creationId xmlns:a16="http://schemas.microsoft.com/office/drawing/2014/main" id="{05E8D7DD-C0BF-411A-81EF-AD51B840566E}"/>
+                <a16:creationId xmlns:a16="http://schemas.microsoft.com/office/drawing/2014/main" id="{57F9D9F0-F937-424D-9F4D-22B966E1D2CD}"/>
               </a:ext>
             </a:extLst>
           </p:cNvPr>
@@ -3901,22 +4365,32 @@
             <a:spLocks noGrp="1"/>
           </p:cNvSpPr>
           <p:nvPr>
-            <p:ph idx="1"/>
-          </p:nvPr>
-        </p:nvSpPr>
-        <p:spPr/>
-        <p:txBody>
-          <a:bodyPr/>
+            <p:ph type="title"/>
+          </p:nvPr>
+        </p:nvSpPr>
+        <p:spPr>
+          <a:xfrm>
+            <a:off x="190829" y="-1910151"/>
+            <a:ext cx="10515600" cy="2852737"/>
+          </a:xfrm>
+        </p:spPr>
+        <p:txBody>
+          <a:bodyPr>
+            <a:normAutofit/>
+          </a:bodyPr>
           <a:lstStyle/>
           <a:p>
-            <a:endParaRPr lang="en-NZ" dirty="0"/>
+            <a:r>
+              <a:rPr lang="en-NZ" sz="4400" dirty="0"/>
+              <a:t>What’s Common Data Service (CDS)?</a:t>
+            </a:r>
           </a:p>
         </p:txBody>
       </p:sp>
     </p:spTree>
     <p:extLst>
       <p:ext uri="{BB962C8B-B14F-4D97-AF65-F5344CB8AC3E}">
-        <p14:creationId xmlns:p14="http://schemas.microsoft.com/office/powerpoint/2010/main" val="2330935862"/>
+        <p14:creationId xmlns:p14="http://schemas.microsoft.com/office/powerpoint/2010/main" val="1425141625"/>
       </p:ext>
     </p:extLst>
   </p:cSld>
@@ -3948,7 +4422,7 @@
           <p:cNvPr id="2" name="Title 1">
             <a:extLst>
               <a:ext uri="{FF2B5EF4-FFF2-40B4-BE49-F238E27FC236}">
-                <a16:creationId xmlns:a16="http://schemas.microsoft.com/office/drawing/2014/main" id="{A986489C-56B2-4112-83F6-AE3F3DB28305}"/>
+                <a16:creationId xmlns:a16="http://schemas.microsoft.com/office/drawing/2014/main" id="{755A687A-B3FB-4D16-8E00-6CD2539E9BB2}"/>
               </a:ext>
             </a:extLst>
           </p:cNvPr>
@@ -3959,21 +4433,31 @@
             <p:ph type="title"/>
           </p:nvPr>
         </p:nvSpPr>
-        <p:spPr/>
-        <p:txBody>
-          <a:bodyPr/>
+        <p:spPr>
+          <a:xfrm>
+            <a:off x="501912" y="72228"/>
+            <a:ext cx="10515600" cy="942586"/>
+          </a:xfrm>
+        </p:spPr>
+        <p:txBody>
+          <a:bodyPr>
+            <a:normAutofit/>
+          </a:bodyPr>
           <a:lstStyle/>
           <a:p>
-            <a:endParaRPr lang="en-NZ"/>
-          </a:p>
-        </p:txBody>
-      </p:sp>
-      <p:sp>
-        <p:nvSpPr>
-          <p:cNvPr id="3" name="Content Placeholder 2">
+            <a:r>
+              <a:rPr lang="en-NZ" sz="5400" dirty="0"/>
+              <a:t>CDS Capabilities</a:t>
+            </a:r>
+          </a:p>
+        </p:txBody>
+      </p:sp>
+      <p:sp>
+        <p:nvSpPr>
+          <p:cNvPr id="3" name="Text Placeholder 2">
             <a:extLst>
               <a:ext uri="{FF2B5EF4-FFF2-40B4-BE49-F238E27FC236}">
-                <a16:creationId xmlns:a16="http://schemas.microsoft.com/office/drawing/2014/main" id="{43295DA7-1E9F-4CC9-8A76-0FEF18EEBEB6}"/>
+                <a16:creationId xmlns:a16="http://schemas.microsoft.com/office/drawing/2014/main" id="{D0253C7D-CE77-406A-BAF3-148602B8EB4A}"/>
               </a:ext>
             </a:extLst>
           </p:cNvPr>
@@ -3981,42 +4465,1067 @@
             <a:spLocks noGrp="1"/>
           </p:cNvSpPr>
           <p:nvPr>
-            <p:ph idx="1"/>
-          </p:nvPr>
-        </p:nvSpPr>
-        <p:spPr/>
+            <p:ph type="body" idx="1"/>
+          </p:nvPr>
+        </p:nvSpPr>
+        <p:spPr>
+          <a:xfrm>
+            <a:off x="501912" y="991680"/>
+            <a:ext cx="10515600" cy="1500187"/>
+          </a:xfrm>
+        </p:spPr>
         <p:txBody>
           <a:bodyPr/>
           <a:lstStyle/>
           <a:p>
-            <a:endParaRPr lang="en-NZ"/>
+            <a:r>
+              <a:rPr lang="en-NZ" dirty="0"/>
+              <a:t>Just to name a few…</a:t>
+            </a:r>
+          </a:p>
+        </p:txBody>
+      </p:sp>
+      <p:sp>
+        <p:nvSpPr>
+          <p:cNvPr id="4" name="Rectangle 3">
+            <a:extLst>
+              <a:ext uri="{FF2B5EF4-FFF2-40B4-BE49-F238E27FC236}">
+                <a16:creationId xmlns:a16="http://schemas.microsoft.com/office/drawing/2014/main" id="{2CEC1621-DF25-4A02-BEE0-14C64667BA05}"/>
+              </a:ext>
+            </a:extLst>
+          </p:cNvPr>
+          <p:cNvSpPr/>
+          <p:nvPr/>
+        </p:nvSpPr>
+        <p:spPr>
+          <a:xfrm>
+            <a:off x="636811" y="1836210"/>
+            <a:ext cx="5365380" cy="461665"/>
+          </a:xfrm>
+          <a:prstGeom prst="rect">
+            <a:avLst/>
+          </a:prstGeom>
+        </p:spPr>
+        <p:txBody>
+          <a:bodyPr wrap="none" anchor="ctr">
+            <a:spAutoFit/>
+          </a:bodyPr>
+          <a:lstStyle/>
+          <a:p>
+            <a:pPr algn="ctr"/>
+            <a:r>
+              <a:rPr lang="en-NZ" sz="2400" dirty="0">
+                <a:solidFill>
+                  <a:schemeClr val="accent1"/>
+                </a:solidFill>
+              </a:rPr>
+              <a:t>Centralized and secure data management</a:t>
+            </a:r>
+          </a:p>
+        </p:txBody>
+      </p:sp>
+      <p:sp>
+        <p:nvSpPr>
+          <p:cNvPr id="5" name="Rectangle 4">
+            <a:extLst>
+              <a:ext uri="{FF2B5EF4-FFF2-40B4-BE49-F238E27FC236}">
+                <a16:creationId xmlns:a16="http://schemas.microsoft.com/office/drawing/2014/main" id="{3B94F60D-D974-4D73-99F8-BAE7F0245A00}"/>
+              </a:ext>
+            </a:extLst>
+          </p:cNvPr>
+          <p:cNvSpPr/>
+          <p:nvPr/>
+        </p:nvSpPr>
+        <p:spPr>
+          <a:xfrm>
+            <a:off x="1869658" y="2600628"/>
+            <a:ext cx="2579872" cy="923330"/>
+          </a:xfrm>
+          <a:prstGeom prst="rect">
+            <a:avLst/>
+          </a:prstGeom>
+        </p:spPr>
+        <p:txBody>
+          <a:bodyPr wrap="none" anchor="ctr">
+            <a:spAutoFit/>
+          </a:bodyPr>
+          <a:lstStyle/>
+          <a:p>
+            <a:r>
+              <a:rPr lang="en-NZ" b="1" dirty="0">
+                <a:solidFill>
+                  <a:schemeClr val="accent1"/>
+                </a:solidFill>
+              </a:rPr>
+              <a:t>Security management </a:t>
+            </a:r>
+          </a:p>
+          <a:p>
+            <a:r>
+              <a:rPr lang="en-NZ" dirty="0">
+                <a:solidFill>
+                  <a:schemeClr val="accent1"/>
+                </a:solidFill>
+              </a:rPr>
+              <a:t>Azure AD integration</a:t>
+            </a:r>
+          </a:p>
+          <a:p>
+            <a:r>
+              <a:rPr lang="en-NZ" dirty="0">
+                <a:solidFill>
+                  <a:schemeClr val="accent1"/>
+                </a:solidFill>
+              </a:rPr>
+              <a:t>Role based access control</a:t>
+            </a:r>
+          </a:p>
+        </p:txBody>
+      </p:sp>
+      <p:sp>
+        <p:nvSpPr>
+          <p:cNvPr id="6" name="Rectangle 5">
+            <a:extLst>
+              <a:ext uri="{FF2B5EF4-FFF2-40B4-BE49-F238E27FC236}">
+                <a16:creationId xmlns:a16="http://schemas.microsoft.com/office/drawing/2014/main" id="{E2F8F480-ED56-4668-B4AC-06733223A0CA}"/>
+              </a:ext>
+            </a:extLst>
+          </p:cNvPr>
+          <p:cNvSpPr/>
+          <p:nvPr/>
+        </p:nvSpPr>
+        <p:spPr>
+          <a:xfrm>
+            <a:off x="3658865" y="4267592"/>
+            <a:ext cx="2662972" cy="923330"/>
+          </a:xfrm>
+          <a:prstGeom prst="rect">
+            <a:avLst/>
+          </a:prstGeom>
+        </p:spPr>
+        <p:txBody>
+          <a:bodyPr wrap="none" anchor="ctr">
+            <a:spAutoFit/>
+          </a:bodyPr>
+          <a:lstStyle/>
+          <a:p>
+            <a:r>
+              <a:rPr lang="en-NZ" b="1" dirty="0">
+                <a:solidFill>
+                  <a:schemeClr val="accent1"/>
+                </a:solidFill>
+              </a:rPr>
+              <a:t>Email management</a:t>
+            </a:r>
+          </a:p>
+          <a:p>
+            <a:r>
+              <a:rPr lang="en-NZ" dirty="0">
+                <a:solidFill>
+                  <a:schemeClr val="accent1"/>
+                </a:solidFill>
+              </a:rPr>
+              <a:t>Exchange integration</a:t>
+            </a:r>
+          </a:p>
+          <a:p>
+            <a:pPr algn="ctr"/>
+            <a:r>
+              <a:rPr lang="en-NZ" dirty="0">
+                <a:solidFill>
+                  <a:schemeClr val="accent1"/>
+                </a:solidFill>
+              </a:rPr>
+              <a:t>Communication templates</a:t>
+            </a:r>
+          </a:p>
+        </p:txBody>
+      </p:sp>
+      <p:sp>
+        <p:nvSpPr>
+          <p:cNvPr id="7" name="Rectangle 6">
+            <a:extLst>
+              <a:ext uri="{FF2B5EF4-FFF2-40B4-BE49-F238E27FC236}">
+                <a16:creationId xmlns:a16="http://schemas.microsoft.com/office/drawing/2014/main" id="{0BEBF147-EA9B-403D-81A5-42057126CAF3}"/>
+              </a:ext>
+            </a:extLst>
+          </p:cNvPr>
+          <p:cNvSpPr/>
+          <p:nvPr/>
+        </p:nvSpPr>
+        <p:spPr>
+          <a:xfrm>
+            <a:off x="1094016" y="5624121"/>
+            <a:ext cx="3787480" cy="967957"/>
+          </a:xfrm>
+          <a:prstGeom prst="rect">
+            <a:avLst/>
+          </a:prstGeom>
+        </p:spPr>
+        <p:txBody>
+          <a:bodyPr wrap="square" anchor="ctr">
+            <a:spAutoFit/>
+          </a:bodyPr>
+          <a:lstStyle/>
+          <a:p>
+            <a:pPr algn="ctr">
+              <a:lnSpc>
+                <a:spcPct val="150000"/>
+              </a:lnSpc>
+            </a:pPr>
+            <a:r>
+              <a:rPr lang="en-NZ" sz="2000" b="1" dirty="0">
+                <a:solidFill>
+                  <a:schemeClr val="accent1"/>
+                </a:solidFill>
+              </a:rPr>
+              <a:t>Administer and monitor</a:t>
+            </a:r>
+          </a:p>
+          <a:p>
+            <a:pPr algn="ctr">
+              <a:lnSpc>
+                <a:spcPct val="150000"/>
+              </a:lnSpc>
+            </a:pPr>
+            <a:r>
+              <a:rPr lang="en-NZ" sz="2000" b="1" dirty="0">
+                <a:solidFill>
+                  <a:schemeClr val="accent1"/>
+                </a:solidFill>
+              </a:rPr>
+              <a:t>DevOps Tooling</a:t>
+            </a:r>
+          </a:p>
+        </p:txBody>
+      </p:sp>
+      <p:sp>
+        <p:nvSpPr>
+          <p:cNvPr id="8" name="Rectangle 7">
+            <a:extLst>
+              <a:ext uri="{FF2B5EF4-FFF2-40B4-BE49-F238E27FC236}">
+                <a16:creationId xmlns:a16="http://schemas.microsoft.com/office/drawing/2014/main" id="{E7732C5B-954E-4BAF-854C-75D1455594FA}"/>
+              </a:ext>
+            </a:extLst>
+          </p:cNvPr>
+          <p:cNvSpPr/>
+          <p:nvPr/>
+        </p:nvSpPr>
+        <p:spPr>
+          <a:xfrm>
+            <a:off x="6815818" y="27312"/>
+            <a:ext cx="6096000" cy="6666569"/>
+          </a:xfrm>
+          <a:prstGeom prst="rect">
+            <a:avLst/>
+          </a:prstGeom>
+        </p:spPr>
+        <p:txBody>
+          <a:bodyPr anchor="ctr">
+            <a:spAutoFit/>
+          </a:bodyPr>
+          <a:lstStyle/>
+          <a:p>
+            <a:pPr>
+              <a:lnSpc>
+                <a:spcPct val="200000"/>
+              </a:lnSpc>
+            </a:pPr>
+            <a:r>
+              <a:rPr lang="en-NZ" dirty="0">
+                <a:solidFill>
+                  <a:schemeClr val="accent1"/>
+                </a:solidFill>
+              </a:rPr>
+              <a:t>Activities/Interactions management</a:t>
+            </a:r>
+          </a:p>
+          <a:p>
+            <a:pPr>
+              <a:lnSpc>
+                <a:spcPct val="200000"/>
+              </a:lnSpc>
+            </a:pPr>
+            <a:r>
+              <a:rPr lang="en-NZ" dirty="0">
+                <a:solidFill>
+                  <a:schemeClr val="accent1"/>
+                </a:solidFill>
+              </a:rPr>
+              <a:t>Accounts and Contacts management</a:t>
+            </a:r>
+          </a:p>
+          <a:p>
+            <a:pPr>
+              <a:lnSpc>
+                <a:spcPct val="200000"/>
+              </a:lnSpc>
+            </a:pPr>
+            <a:r>
+              <a:rPr lang="en-NZ" dirty="0">
+                <a:solidFill>
+                  <a:schemeClr val="accent1"/>
+                </a:solidFill>
+              </a:rPr>
+              <a:t>Data Management (import and export capabilities)</a:t>
+            </a:r>
+          </a:p>
+          <a:p>
+            <a:pPr>
+              <a:lnSpc>
+                <a:spcPct val="200000"/>
+              </a:lnSpc>
+            </a:pPr>
+            <a:r>
+              <a:rPr lang="en-NZ" sz="2400" dirty="0">
+                <a:solidFill>
+                  <a:schemeClr val="accent1"/>
+                </a:solidFill>
+              </a:rPr>
+              <a:t>Reporting and dashboards</a:t>
+            </a:r>
+          </a:p>
+          <a:p>
+            <a:pPr>
+              <a:lnSpc>
+                <a:spcPct val="200000"/>
+              </a:lnSpc>
+            </a:pPr>
+            <a:r>
+              <a:rPr lang="en-NZ" sz="2000" dirty="0">
+                <a:solidFill>
+                  <a:schemeClr val="accent1"/>
+                </a:solidFill>
+              </a:rPr>
+              <a:t>Users and Queue management</a:t>
+            </a:r>
+          </a:p>
+          <a:p>
+            <a:pPr>
+              <a:lnSpc>
+                <a:spcPct val="200000"/>
+              </a:lnSpc>
+            </a:pPr>
+            <a:r>
+              <a:rPr lang="en-NZ" dirty="0">
+                <a:solidFill>
+                  <a:schemeClr val="accent1"/>
+                </a:solidFill>
+              </a:rPr>
+              <a:t>No code business logic client &amp; server side</a:t>
+            </a:r>
+          </a:p>
+          <a:p>
+            <a:pPr>
+              <a:lnSpc>
+                <a:spcPct val="150000"/>
+              </a:lnSpc>
+            </a:pPr>
+            <a:r>
+              <a:rPr lang="en-NZ" sz="2000" b="1" dirty="0">
+                <a:solidFill>
+                  <a:schemeClr val="accent1"/>
+                </a:solidFill>
+              </a:rPr>
+              <a:t>SDKs and APIs</a:t>
+            </a:r>
+          </a:p>
+          <a:p>
+            <a:pPr>
+              <a:lnSpc>
+                <a:spcPct val="150000"/>
+              </a:lnSpc>
+            </a:pPr>
+            <a:r>
+              <a:rPr lang="en-NZ" dirty="0">
+                <a:solidFill>
+                  <a:schemeClr val="accent1"/>
+                </a:solidFill>
+              </a:rPr>
+              <a:t>Auditing and </a:t>
+            </a:r>
+            <a:r>
+              <a:rPr lang="en-NZ" sz="2000" dirty="0">
+                <a:solidFill>
+                  <a:schemeClr val="accent1"/>
+                </a:solidFill>
+              </a:rPr>
+              <a:t>Logging</a:t>
+            </a:r>
+            <a:endParaRPr lang="en-NZ" dirty="0">
+              <a:solidFill>
+                <a:schemeClr val="accent1"/>
+              </a:solidFill>
+            </a:endParaRPr>
+          </a:p>
+          <a:p>
+            <a:pPr>
+              <a:lnSpc>
+                <a:spcPct val="150000"/>
+              </a:lnSpc>
+            </a:pPr>
+            <a:r>
+              <a:rPr lang="en-NZ" dirty="0">
+                <a:solidFill>
+                  <a:schemeClr val="accent1"/>
+                </a:solidFill>
+              </a:rPr>
+              <a:t>Searching and querying</a:t>
+            </a:r>
+          </a:p>
+          <a:p>
+            <a:pPr>
+              <a:lnSpc>
+                <a:spcPct val="150000"/>
+              </a:lnSpc>
+            </a:pPr>
+            <a:r>
+              <a:rPr lang="en-NZ" sz="2000" dirty="0">
+                <a:solidFill>
+                  <a:schemeClr val="accent1"/>
+                </a:solidFill>
+              </a:rPr>
+              <a:t>SharePoint integration</a:t>
+            </a:r>
+          </a:p>
+          <a:p>
+            <a:pPr>
+              <a:lnSpc>
+                <a:spcPct val="150000"/>
+              </a:lnSpc>
+            </a:pPr>
+            <a:r>
+              <a:rPr lang="en-NZ" dirty="0">
+                <a:solidFill>
+                  <a:schemeClr val="accent1"/>
+                </a:solidFill>
+              </a:rPr>
+              <a:t>Currency management</a:t>
+            </a:r>
+          </a:p>
+          <a:p>
+            <a:pPr>
+              <a:lnSpc>
+                <a:spcPct val="150000"/>
+              </a:lnSpc>
+            </a:pPr>
+            <a:r>
+              <a:rPr lang="en-NZ" dirty="0">
+                <a:solidFill>
+                  <a:schemeClr val="accent1"/>
+                </a:solidFill>
+              </a:rPr>
+              <a:t>Data Duplication Detection</a:t>
+            </a:r>
+          </a:p>
+          <a:p>
+            <a:pPr>
+              <a:lnSpc>
+                <a:spcPct val="150000"/>
+              </a:lnSpc>
+            </a:pPr>
+            <a:r>
+              <a:rPr lang="en-NZ" dirty="0">
+                <a:solidFill>
+                  <a:schemeClr val="accent1"/>
+                </a:solidFill>
+              </a:rPr>
+              <a:t>Multi-language support</a:t>
+            </a:r>
+          </a:p>
+        </p:txBody>
+      </p:sp>
+      <p:sp>
+        <p:nvSpPr>
+          <p:cNvPr id="10" name="Rectangle 9">
+            <a:extLst>
+              <a:ext uri="{FF2B5EF4-FFF2-40B4-BE49-F238E27FC236}">
+                <a16:creationId xmlns:a16="http://schemas.microsoft.com/office/drawing/2014/main" id="{14E35236-4671-4E89-A5CE-2B44A1DF0186}"/>
+              </a:ext>
+            </a:extLst>
+          </p:cNvPr>
+          <p:cNvSpPr/>
+          <p:nvPr/>
+        </p:nvSpPr>
+        <p:spPr>
+          <a:xfrm>
+            <a:off x="476782" y="3598956"/>
+            <a:ext cx="4203330" cy="568745"/>
+          </a:xfrm>
+          <a:prstGeom prst="rect">
+            <a:avLst/>
+          </a:prstGeom>
+        </p:spPr>
+        <p:txBody>
+          <a:bodyPr wrap="none">
+            <a:spAutoFit/>
+          </a:bodyPr>
+          <a:lstStyle/>
+          <a:p>
+            <a:pPr>
+              <a:lnSpc>
+                <a:spcPct val="200000"/>
+              </a:lnSpc>
+            </a:pPr>
+            <a:r>
+              <a:rPr lang="en-NZ" b="1" dirty="0">
+                <a:solidFill>
+                  <a:schemeClr val="accent1"/>
+                </a:solidFill>
+              </a:rPr>
+              <a:t>Model-driven apps (forms and navigation)</a:t>
+            </a:r>
           </a:p>
         </p:txBody>
       </p:sp>
     </p:spTree>
     <p:extLst>
       <p:ext uri="{BB962C8B-B14F-4D97-AF65-F5344CB8AC3E}">
-        <p14:creationId xmlns:p14="http://schemas.microsoft.com/office/powerpoint/2010/main" val="1136534001"/>
+        <p14:creationId xmlns:p14="http://schemas.microsoft.com/office/powerpoint/2010/main" val="1177642707"/>
       </p:ext>
     </p:extLst>
   </p:cSld>
   <p:clrMapOvr>
     <a:masterClrMapping/>
   </p:clrMapOvr>
+  <p:timing>
+    <p:tnLst>
+      <p:par>
+        <p:cTn id="1" dur="indefinite" restart="never" nodeType="tmRoot">
+          <p:childTnLst>
+            <p:seq concurrent="1" nextAc="seek">
+              <p:cTn id="2" dur="indefinite" nodeType="mainSeq">
+                <p:childTnLst>
+                  <p:par>
+                    <p:cTn id="3" fill="hold">
+                      <p:stCondLst>
+                        <p:cond delay="indefinite"/>
+                      </p:stCondLst>
+                      <p:childTnLst>
+                        <p:par>
+                          <p:cTn id="4" fill="hold">
+                            <p:stCondLst>
+                              <p:cond delay="0"/>
+                            </p:stCondLst>
+                            <p:childTnLst>
+                              <p:par>
+                                <p:cTn id="5" presetID="42" presetClass="entr" presetSubtype="0" fill="hold" grpId="0" nodeType="clickEffect">
+                                  <p:stCondLst>
+                                    <p:cond delay="0"/>
+                                  </p:stCondLst>
+                                  <p:childTnLst>
+                                    <p:set>
+                                      <p:cBhvr>
+                                        <p:cTn id="6" dur="1" fill="hold">
+                                          <p:stCondLst>
+                                            <p:cond delay="0"/>
+                                          </p:stCondLst>
+                                        </p:cTn>
+                                        <p:tgtEl>
+                                          <p:spTgt spid="10"/>
+                                        </p:tgtEl>
+                                        <p:attrNameLst>
+                                          <p:attrName>style.visibility</p:attrName>
+                                        </p:attrNameLst>
+                                      </p:cBhvr>
+                                      <p:to>
+                                        <p:strVal val="visible"/>
+                                      </p:to>
+                                    </p:set>
+                                    <p:animEffect transition="in" filter="fade">
+                                      <p:cBhvr>
+                                        <p:cTn id="7" dur="1000"/>
+                                        <p:tgtEl>
+                                          <p:spTgt spid="10"/>
+                                        </p:tgtEl>
+                                      </p:cBhvr>
+                                    </p:animEffect>
+                                    <p:anim calcmode="lin" valueType="num">
+                                      <p:cBhvr>
+                                        <p:cTn id="8" dur="1000" fill="hold"/>
+                                        <p:tgtEl>
+                                          <p:spTgt spid="10"/>
+                                        </p:tgtEl>
+                                        <p:attrNameLst>
+                                          <p:attrName>ppt_x</p:attrName>
+                                        </p:attrNameLst>
+                                      </p:cBhvr>
+                                      <p:tavLst>
+                                        <p:tav tm="0">
+                                          <p:val>
+                                            <p:strVal val="#ppt_x"/>
+                                          </p:val>
+                                        </p:tav>
+                                        <p:tav tm="100000">
+                                          <p:val>
+                                            <p:strVal val="#ppt_x"/>
+                                          </p:val>
+                                        </p:tav>
+                                      </p:tavLst>
+                                    </p:anim>
+                                    <p:anim calcmode="lin" valueType="num">
+                                      <p:cBhvr>
+                                        <p:cTn id="9" dur="1000" fill="hold"/>
+                                        <p:tgtEl>
+                                          <p:spTgt spid="10"/>
+                                        </p:tgtEl>
+                                        <p:attrNameLst>
+                                          <p:attrName>ppt_y</p:attrName>
+                                        </p:attrNameLst>
+                                      </p:cBhvr>
+                                      <p:tavLst>
+                                        <p:tav tm="0">
+                                          <p:val>
+                                            <p:strVal val="#ppt_y+.1"/>
+                                          </p:val>
+                                        </p:tav>
+                                        <p:tav tm="100000">
+                                          <p:val>
+                                            <p:strVal val="#ppt_y"/>
+                                          </p:val>
+                                        </p:tav>
+                                      </p:tavLst>
+                                    </p:anim>
+                                  </p:childTnLst>
+                                </p:cTn>
+                              </p:par>
+                            </p:childTnLst>
+                          </p:cTn>
+                        </p:par>
+                      </p:childTnLst>
+                    </p:cTn>
+                  </p:par>
+                  <p:par>
+                    <p:cTn id="10" fill="hold">
+                      <p:stCondLst>
+                        <p:cond delay="indefinite"/>
+                      </p:stCondLst>
+                      <p:childTnLst>
+                        <p:par>
+                          <p:cTn id="11" fill="hold">
+                            <p:stCondLst>
+                              <p:cond delay="0"/>
+                            </p:stCondLst>
+                            <p:childTnLst>
+                              <p:par>
+                                <p:cTn id="12" presetID="42" presetClass="entr" presetSubtype="0" fill="hold" grpId="0" nodeType="clickEffect">
+                                  <p:stCondLst>
+                                    <p:cond delay="0"/>
+                                  </p:stCondLst>
+                                  <p:childTnLst>
+                                    <p:set>
+                                      <p:cBhvr>
+                                        <p:cTn id="13" dur="1" fill="hold">
+                                          <p:stCondLst>
+                                            <p:cond delay="0"/>
+                                          </p:stCondLst>
+                                        </p:cTn>
+                                        <p:tgtEl>
+                                          <p:spTgt spid="5"/>
+                                        </p:tgtEl>
+                                        <p:attrNameLst>
+                                          <p:attrName>style.visibility</p:attrName>
+                                        </p:attrNameLst>
+                                      </p:cBhvr>
+                                      <p:to>
+                                        <p:strVal val="visible"/>
+                                      </p:to>
+                                    </p:set>
+                                    <p:animEffect transition="in" filter="fade">
+                                      <p:cBhvr>
+                                        <p:cTn id="14" dur="1000"/>
+                                        <p:tgtEl>
+                                          <p:spTgt spid="5"/>
+                                        </p:tgtEl>
+                                      </p:cBhvr>
+                                    </p:animEffect>
+                                    <p:anim calcmode="lin" valueType="num">
+                                      <p:cBhvr>
+                                        <p:cTn id="15" dur="1000" fill="hold"/>
+                                        <p:tgtEl>
+                                          <p:spTgt spid="5"/>
+                                        </p:tgtEl>
+                                        <p:attrNameLst>
+                                          <p:attrName>ppt_x</p:attrName>
+                                        </p:attrNameLst>
+                                      </p:cBhvr>
+                                      <p:tavLst>
+                                        <p:tav tm="0">
+                                          <p:val>
+                                            <p:strVal val="#ppt_x"/>
+                                          </p:val>
+                                        </p:tav>
+                                        <p:tav tm="100000">
+                                          <p:val>
+                                            <p:strVal val="#ppt_x"/>
+                                          </p:val>
+                                        </p:tav>
+                                      </p:tavLst>
+                                    </p:anim>
+                                    <p:anim calcmode="lin" valueType="num">
+                                      <p:cBhvr>
+                                        <p:cTn id="16" dur="1000" fill="hold"/>
+                                        <p:tgtEl>
+                                          <p:spTgt spid="5"/>
+                                        </p:tgtEl>
+                                        <p:attrNameLst>
+                                          <p:attrName>ppt_y</p:attrName>
+                                        </p:attrNameLst>
+                                      </p:cBhvr>
+                                      <p:tavLst>
+                                        <p:tav tm="0">
+                                          <p:val>
+                                            <p:strVal val="#ppt_y+.1"/>
+                                          </p:val>
+                                        </p:tav>
+                                        <p:tav tm="100000">
+                                          <p:val>
+                                            <p:strVal val="#ppt_y"/>
+                                          </p:val>
+                                        </p:tav>
+                                      </p:tavLst>
+                                    </p:anim>
+                                  </p:childTnLst>
+                                </p:cTn>
+                              </p:par>
+                            </p:childTnLst>
+                          </p:cTn>
+                        </p:par>
+                      </p:childTnLst>
+                    </p:cTn>
+                  </p:par>
+                  <p:par>
+                    <p:cTn id="17" fill="hold">
+                      <p:stCondLst>
+                        <p:cond delay="indefinite"/>
+                      </p:stCondLst>
+                      <p:childTnLst>
+                        <p:par>
+                          <p:cTn id="18" fill="hold">
+                            <p:stCondLst>
+                              <p:cond delay="0"/>
+                            </p:stCondLst>
+                            <p:childTnLst>
+                              <p:par>
+                                <p:cTn id="19" presetID="42" presetClass="entr" presetSubtype="0" fill="hold" grpId="0" nodeType="clickEffect">
+                                  <p:stCondLst>
+                                    <p:cond delay="0"/>
+                                  </p:stCondLst>
+                                  <p:childTnLst>
+                                    <p:set>
+                                      <p:cBhvr>
+                                        <p:cTn id="20" dur="1" fill="hold">
+                                          <p:stCondLst>
+                                            <p:cond delay="0"/>
+                                          </p:stCondLst>
+                                        </p:cTn>
+                                        <p:tgtEl>
+                                          <p:spTgt spid="6"/>
+                                        </p:tgtEl>
+                                        <p:attrNameLst>
+                                          <p:attrName>style.visibility</p:attrName>
+                                        </p:attrNameLst>
+                                      </p:cBhvr>
+                                      <p:to>
+                                        <p:strVal val="visible"/>
+                                      </p:to>
+                                    </p:set>
+                                    <p:animEffect transition="in" filter="fade">
+                                      <p:cBhvr>
+                                        <p:cTn id="21" dur="1000"/>
+                                        <p:tgtEl>
+                                          <p:spTgt spid="6"/>
+                                        </p:tgtEl>
+                                      </p:cBhvr>
+                                    </p:animEffect>
+                                    <p:anim calcmode="lin" valueType="num">
+                                      <p:cBhvr>
+                                        <p:cTn id="22" dur="1000" fill="hold"/>
+                                        <p:tgtEl>
+                                          <p:spTgt spid="6"/>
+                                        </p:tgtEl>
+                                        <p:attrNameLst>
+                                          <p:attrName>ppt_x</p:attrName>
+                                        </p:attrNameLst>
+                                      </p:cBhvr>
+                                      <p:tavLst>
+                                        <p:tav tm="0">
+                                          <p:val>
+                                            <p:strVal val="#ppt_x"/>
+                                          </p:val>
+                                        </p:tav>
+                                        <p:tav tm="100000">
+                                          <p:val>
+                                            <p:strVal val="#ppt_x"/>
+                                          </p:val>
+                                        </p:tav>
+                                      </p:tavLst>
+                                    </p:anim>
+                                    <p:anim calcmode="lin" valueType="num">
+                                      <p:cBhvr>
+                                        <p:cTn id="23" dur="1000" fill="hold"/>
+                                        <p:tgtEl>
+                                          <p:spTgt spid="6"/>
+                                        </p:tgtEl>
+                                        <p:attrNameLst>
+                                          <p:attrName>ppt_y</p:attrName>
+                                        </p:attrNameLst>
+                                      </p:cBhvr>
+                                      <p:tavLst>
+                                        <p:tav tm="0">
+                                          <p:val>
+                                            <p:strVal val="#ppt_y+.1"/>
+                                          </p:val>
+                                        </p:tav>
+                                        <p:tav tm="100000">
+                                          <p:val>
+                                            <p:strVal val="#ppt_y"/>
+                                          </p:val>
+                                        </p:tav>
+                                      </p:tavLst>
+                                    </p:anim>
+                                  </p:childTnLst>
+                                </p:cTn>
+                              </p:par>
+                            </p:childTnLst>
+                          </p:cTn>
+                        </p:par>
+                      </p:childTnLst>
+                    </p:cTn>
+                  </p:par>
+                  <p:par>
+                    <p:cTn id="24" fill="hold">
+                      <p:stCondLst>
+                        <p:cond delay="indefinite"/>
+                      </p:stCondLst>
+                      <p:childTnLst>
+                        <p:par>
+                          <p:cTn id="25" fill="hold">
+                            <p:stCondLst>
+                              <p:cond delay="0"/>
+                            </p:stCondLst>
+                            <p:childTnLst>
+                              <p:par>
+                                <p:cTn id="26" presetID="42" presetClass="entr" presetSubtype="0" fill="hold" grpId="0" nodeType="clickEffect">
+                                  <p:stCondLst>
+                                    <p:cond delay="0"/>
+                                  </p:stCondLst>
+                                  <p:childTnLst>
+                                    <p:set>
+                                      <p:cBhvr>
+                                        <p:cTn id="27" dur="1" fill="hold">
+                                          <p:stCondLst>
+                                            <p:cond delay="0"/>
+                                          </p:stCondLst>
+                                        </p:cTn>
+                                        <p:tgtEl>
+                                          <p:spTgt spid="7"/>
+                                        </p:tgtEl>
+                                        <p:attrNameLst>
+                                          <p:attrName>style.visibility</p:attrName>
+                                        </p:attrNameLst>
+                                      </p:cBhvr>
+                                      <p:to>
+                                        <p:strVal val="visible"/>
+                                      </p:to>
+                                    </p:set>
+                                    <p:animEffect transition="in" filter="fade">
+                                      <p:cBhvr>
+                                        <p:cTn id="28" dur="1000"/>
+                                        <p:tgtEl>
+                                          <p:spTgt spid="7"/>
+                                        </p:tgtEl>
+                                      </p:cBhvr>
+                                    </p:animEffect>
+                                    <p:anim calcmode="lin" valueType="num">
+                                      <p:cBhvr>
+                                        <p:cTn id="29" dur="1000" fill="hold"/>
+                                        <p:tgtEl>
+                                          <p:spTgt spid="7"/>
+                                        </p:tgtEl>
+                                        <p:attrNameLst>
+                                          <p:attrName>ppt_x</p:attrName>
+                                        </p:attrNameLst>
+                                      </p:cBhvr>
+                                      <p:tavLst>
+                                        <p:tav tm="0">
+                                          <p:val>
+                                            <p:strVal val="#ppt_x"/>
+                                          </p:val>
+                                        </p:tav>
+                                        <p:tav tm="100000">
+                                          <p:val>
+                                            <p:strVal val="#ppt_x"/>
+                                          </p:val>
+                                        </p:tav>
+                                      </p:tavLst>
+                                    </p:anim>
+                                    <p:anim calcmode="lin" valueType="num">
+                                      <p:cBhvr>
+                                        <p:cTn id="30" dur="1000" fill="hold"/>
+                                        <p:tgtEl>
+                                          <p:spTgt spid="7"/>
+                                        </p:tgtEl>
+                                        <p:attrNameLst>
+                                          <p:attrName>ppt_y</p:attrName>
+                                        </p:attrNameLst>
+                                      </p:cBhvr>
+                                      <p:tavLst>
+                                        <p:tav tm="0">
+                                          <p:val>
+                                            <p:strVal val="#ppt_y+.1"/>
+                                          </p:val>
+                                        </p:tav>
+                                        <p:tav tm="100000">
+                                          <p:val>
+                                            <p:strVal val="#ppt_y"/>
+                                          </p:val>
+                                        </p:tav>
+                                      </p:tavLst>
+                                    </p:anim>
+                                  </p:childTnLst>
+                                </p:cTn>
+                              </p:par>
+                            </p:childTnLst>
+                          </p:cTn>
+                        </p:par>
+                      </p:childTnLst>
+                    </p:cTn>
+                  </p:par>
+                  <p:par>
+                    <p:cTn id="31" fill="hold">
+                      <p:stCondLst>
+                        <p:cond delay="indefinite"/>
+                      </p:stCondLst>
+                      <p:childTnLst>
+                        <p:par>
+                          <p:cTn id="32" fill="hold">
+                            <p:stCondLst>
+                              <p:cond delay="0"/>
+                            </p:stCondLst>
+                            <p:childTnLst>
+                              <p:par>
+                                <p:cTn id="33" presetID="42" presetClass="entr" presetSubtype="0" fill="hold" grpId="0" nodeType="clickEffect">
+                                  <p:stCondLst>
+                                    <p:cond delay="0"/>
+                                  </p:stCondLst>
+                                  <p:childTnLst>
+                                    <p:set>
+                                      <p:cBhvr>
+                                        <p:cTn id="34" dur="1" fill="hold">
+                                          <p:stCondLst>
+                                            <p:cond delay="0"/>
+                                          </p:stCondLst>
+                                        </p:cTn>
+                                        <p:tgtEl>
+                                          <p:spTgt spid="8"/>
+                                        </p:tgtEl>
+                                        <p:attrNameLst>
+                                          <p:attrName>style.visibility</p:attrName>
+                                        </p:attrNameLst>
+                                      </p:cBhvr>
+                                      <p:to>
+                                        <p:strVal val="visible"/>
+                                      </p:to>
+                                    </p:set>
+                                    <p:animEffect transition="in" filter="fade">
+                                      <p:cBhvr>
+                                        <p:cTn id="35" dur="1000"/>
+                                        <p:tgtEl>
+                                          <p:spTgt spid="8"/>
+                                        </p:tgtEl>
+                                      </p:cBhvr>
+                                    </p:animEffect>
+                                    <p:anim calcmode="lin" valueType="num">
+                                      <p:cBhvr>
+                                        <p:cTn id="36" dur="1000" fill="hold"/>
+                                        <p:tgtEl>
+                                          <p:spTgt spid="8"/>
+                                        </p:tgtEl>
+                                        <p:attrNameLst>
+                                          <p:attrName>ppt_x</p:attrName>
+                                        </p:attrNameLst>
+                                      </p:cBhvr>
+                                      <p:tavLst>
+                                        <p:tav tm="0">
+                                          <p:val>
+                                            <p:strVal val="#ppt_x"/>
+                                          </p:val>
+                                        </p:tav>
+                                        <p:tav tm="100000">
+                                          <p:val>
+                                            <p:strVal val="#ppt_x"/>
+                                          </p:val>
+                                        </p:tav>
+                                      </p:tavLst>
+                                    </p:anim>
+                                    <p:anim calcmode="lin" valueType="num">
+                                      <p:cBhvr>
+                                        <p:cTn id="37" dur="1000" fill="hold"/>
+                                        <p:tgtEl>
+                                          <p:spTgt spid="8"/>
+                                        </p:tgtEl>
+                                        <p:attrNameLst>
+                                          <p:attrName>ppt_y</p:attrName>
+                                        </p:attrNameLst>
+                                      </p:cBhvr>
+                                      <p:tavLst>
+                                        <p:tav tm="0">
+                                          <p:val>
+                                            <p:strVal val="#ppt_y+.1"/>
+                                          </p:val>
+                                        </p:tav>
+                                        <p:tav tm="100000">
+                                          <p:val>
+                                            <p:strVal val="#ppt_y"/>
+                                          </p:val>
+                                        </p:tav>
+                                      </p:tavLst>
+                                    </p:anim>
+                                  </p:childTnLst>
+                                </p:cTn>
+                              </p:par>
+                            </p:childTnLst>
+                          </p:cTn>
+                        </p:par>
+                      </p:childTnLst>
+                    </p:cTn>
+                  </p:par>
+                </p:childTnLst>
+              </p:cTn>
+              <p:prevCondLst>
+                <p:cond evt="onPrev" delay="0">
+                  <p:tgtEl>
+                    <p:sldTgt/>
+                  </p:tgtEl>
+                </p:cond>
+              </p:prevCondLst>
+              <p:nextCondLst>
+                <p:cond evt="onNext" delay="0">
+                  <p:tgtEl>
+                    <p:sldTgt/>
+                  </p:tgtEl>
+                </p:cond>
+              </p:nextCondLst>
+            </p:seq>
+          </p:childTnLst>
+        </p:cTn>
+      </p:par>
+    </p:tnLst>
+    <p:bldLst>
+      <p:bldP spid="5" grpId="0"/>
+      <p:bldP spid="6" grpId="0"/>
+      <p:bldP spid="7" grpId="0"/>
+      <p:bldP spid="8" grpId="0"/>
+      <p:bldP spid="10" grpId="0"/>
+    </p:bldLst>
+  </p:timing>
 </p:sld>
 </file>
 
 <file path=ppt/slides/slide4.xml><?xml version="1.0" encoding="utf-8"?>
 <p:sld xmlns:a="http://schemas.openxmlformats.org/drawingml/2006/main" xmlns:r="http://schemas.openxmlformats.org/officeDocument/2006/relationships" xmlns:p="http://schemas.openxmlformats.org/presentationml/2006/main">
   <p:cSld>
-    <p:bg>
-      <p:bgPr>
-        <a:solidFill>
-          <a:schemeClr val="bg1"/>
-        </a:solidFill>
-        <a:effectLst/>
-      </p:bgPr>
-    </p:bg>
     <p:spTree>
       <p:nvGrpSpPr>
         <p:cNvPr id="1" name=""/>
@@ -4036,7 +5545,7 @@
           <p:cNvPr id="2" name="Title 1">
             <a:extLst>
               <a:ext uri="{FF2B5EF4-FFF2-40B4-BE49-F238E27FC236}">
-                <a16:creationId xmlns:a16="http://schemas.microsoft.com/office/drawing/2014/main" id="{40B0BBAE-4C33-4034-B855-9B2814C8FA31}"/>
+                <a16:creationId xmlns:a16="http://schemas.microsoft.com/office/drawing/2014/main" id="{48AAB36B-5CB0-4AFB-9052-07F9A6ACD71A}"/>
               </a:ext>
             </a:extLst>
           </p:cNvPr>
@@ -4049,64 +5558,1176 @@
         </p:nvSpPr>
         <p:spPr>
           <a:xfrm>
-            <a:off x="838200" y="227838"/>
-            <a:ext cx="10515600" cy="1325563"/>
+            <a:off x="368759" y="-254399"/>
+            <a:ext cx="10515600" cy="1133479"/>
           </a:xfrm>
         </p:spPr>
         <p:txBody>
-          <a:bodyPr/>
+          <a:bodyPr>
+            <a:normAutofit/>
+          </a:bodyPr>
           <a:lstStyle/>
           <a:p>
-            <a:pPr algn="ctr"/>
-            <a:r>
-              <a:rPr lang="en-AU" dirty="0">
-                <a:latin typeface="Segoe UI Light" panose="020B0502040204020203" pitchFamily="34" charset="0"/>
-                <a:cs typeface="Segoe UI Light" panose="020B0502040204020203" pitchFamily="34" charset="0"/>
-              </a:rPr>
-              <a:t>Thank you</a:t>
+            <a:r>
+              <a:rPr lang="en-NZ" sz="4400" dirty="0"/>
+              <a:t>Power Platform Landscape</a:t>
             </a:r>
           </a:p>
         </p:txBody>
       </p:sp>
       <p:pic>
         <p:nvPicPr>
-          <p:cNvPr id="6" name="Content Placeholder 5">
+          <p:cNvPr id="4" name="Picture 3">
             <a:extLst>
               <a:ext uri="{FF2B5EF4-FFF2-40B4-BE49-F238E27FC236}">
-                <a16:creationId xmlns:a16="http://schemas.microsoft.com/office/drawing/2014/main" id="{E0E657AD-9437-4355-A8DB-6A51B690851E}"/>
+                <a16:creationId xmlns:a16="http://schemas.microsoft.com/office/drawing/2014/main" id="{95C757BE-F1F5-4F4A-AFE7-197B57DAF59A}"/>
               </a:ext>
             </a:extLst>
           </p:cNvPr>
           <p:cNvPicPr>
-            <a:picLocks noGrp="1" noChangeAspect="1"/>
+            <a:picLocks noChangeAspect="1"/>
           </p:cNvPicPr>
-          <p:nvPr>
-            <p:ph idx="1"/>
-          </p:nvPr>
+          <p:nvPr/>
         </p:nvPicPr>
         <p:blipFill>
-          <a:blip r:embed="rId2">
-            <a:extLst>
-              <a:ext uri="{28A0092B-C50C-407E-A947-70E740481C1C}">
-                <a14:useLocalDpi xmlns:a14="http://schemas.microsoft.com/office/drawing/2010/main" val="0"/>
-              </a:ext>
-            </a:extLst>
-          </a:blip>
+          <a:blip r:embed="rId2"/>
           <a:stretch>
             <a:fillRect/>
           </a:stretch>
         </p:blipFill>
         <p:spPr>
           <a:xfrm>
-            <a:off x="838200" y="2306224"/>
-            <a:ext cx="10515600" cy="2245551"/>
+            <a:off x="1768972" y="953031"/>
+            <a:ext cx="8983412" cy="5810699"/>
           </a:xfrm>
+          <a:prstGeom prst="rect">
+            <a:avLst/>
+          </a:prstGeom>
         </p:spPr>
       </p:pic>
     </p:spTree>
     <p:extLst>
       <p:ext uri="{BB962C8B-B14F-4D97-AF65-F5344CB8AC3E}">
-        <p14:creationId xmlns:p14="http://schemas.microsoft.com/office/powerpoint/2010/main" val="2925640950"/>
+        <p14:creationId xmlns:p14="http://schemas.microsoft.com/office/powerpoint/2010/main" val="3059745710"/>
+      </p:ext>
+    </p:extLst>
+  </p:cSld>
+  <p:clrMapOvr>
+    <a:masterClrMapping/>
+  </p:clrMapOvr>
+</p:sld>
+</file>
+
+<file path=ppt/slides/slide5.xml><?xml version="1.0" encoding="utf-8"?>
+<p:sld xmlns:a="http://schemas.openxmlformats.org/drawingml/2006/main" xmlns:r="http://schemas.openxmlformats.org/officeDocument/2006/relationships" xmlns:p="http://schemas.openxmlformats.org/presentationml/2006/main">
+  <p:cSld>
+    <p:spTree>
+      <p:nvGrpSpPr>
+        <p:cNvPr id="1" name=""/>
+        <p:cNvGrpSpPr/>
+        <p:nvPr/>
+      </p:nvGrpSpPr>
+      <p:grpSpPr>
+        <a:xfrm>
+          <a:off x="0" y="0"/>
+          <a:ext cx="0" cy="0"/>
+          <a:chOff x="0" y="0"/>
+          <a:chExt cx="0" cy="0"/>
+        </a:xfrm>
+      </p:grpSpPr>
+      <p:sp>
+        <p:nvSpPr>
+          <p:cNvPr id="2" name="Title 1">
+            <a:extLst>
+              <a:ext uri="{FF2B5EF4-FFF2-40B4-BE49-F238E27FC236}">
+                <a16:creationId xmlns:a16="http://schemas.microsoft.com/office/drawing/2014/main" id="{48AAB36B-5CB0-4AFB-9052-07F9A6ACD71A}"/>
+              </a:ext>
+            </a:extLst>
+          </p:cNvPr>
+          <p:cNvSpPr>
+            <a:spLocks noGrp="1"/>
+          </p:cNvSpPr>
+          <p:nvPr>
+            <p:ph type="title"/>
+          </p:nvPr>
+        </p:nvSpPr>
+        <p:spPr>
+          <a:xfrm>
+            <a:off x="368759" y="-254399"/>
+            <a:ext cx="10515600" cy="1133479"/>
+          </a:xfrm>
+        </p:spPr>
+        <p:txBody>
+          <a:bodyPr>
+            <a:normAutofit/>
+          </a:bodyPr>
+          <a:lstStyle/>
+          <a:p>
+            <a:r>
+              <a:rPr lang="en-NZ" sz="4400" dirty="0"/>
+              <a:t>Power Platform Landscape</a:t>
+            </a:r>
+          </a:p>
+        </p:txBody>
+      </p:sp>
+      <p:pic>
+        <p:nvPicPr>
+          <p:cNvPr id="3" name="Picture 2">
+            <a:extLst>
+              <a:ext uri="{FF2B5EF4-FFF2-40B4-BE49-F238E27FC236}">
+                <a16:creationId xmlns:a16="http://schemas.microsoft.com/office/drawing/2014/main" id="{6613D2F3-8281-45AC-90B0-74CD259F3F14}"/>
+              </a:ext>
+            </a:extLst>
+          </p:cNvPr>
+          <p:cNvPicPr>
+            <a:picLocks noChangeAspect="1"/>
+          </p:cNvPicPr>
+          <p:nvPr/>
+        </p:nvPicPr>
+        <p:blipFill>
+          <a:blip r:embed="rId2"/>
+          <a:stretch>
+            <a:fillRect/>
+          </a:stretch>
+        </p:blipFill>
+        <p:spPr>
+          <a:xfrm>
+            <a:off x="1853815" y="999750"/>
+            <a:ext cx="9172002" cy="5851250"/>
+          </a:xfrm>
+          <a:prstGeom prst="rect">
+            <a:avLst/>
+          </a:prstGeom>
+        </p:spPr>
+      </p:pic>
+    </p:spTree>
+    <p:extLst>
+      <p:ext uri="{BB962C8B-B14F-4D97-AF65-F5344CB8AC3E}">
+        <p14:creationId xmlns:p14="http://schemas.microsoft.com/office/powerpoint/2010/main" val="3032429087"/>
+      </p:ext>
+    </p:extLst>
+  </p:cSld>
+  <p:clrMapOvr>
+    <a:masterClrMapping/>
+  </p:clrMapOvr>
+</p:sld>
+</file>
+
+<file path=ppt/slides/slide6.xml><?xml version="1.0" encoding="utf-8"?>
+<p:sld xmlns:a="http://schemas.openxmlformats.org/drawingml/2006/main" xmlns:r="http://schemas.openxmlformats.org/officeDocument/2006/relationships" xmlns:p="http://schemas.openxmlformats.org/presentationml/2006/main">
+  <p:cSld>
+    <p:spTree>
+      <p:nvGrpSpPr>
+        <p:cNvPr id="1" name=""/>
+        <p:cNvGrpSpPr/>
+        <p:nvPr/>
+      </p:nvGrpSpPr>
+      <p:grpSpPr>
+        <a:xfrm>
+          <a:off x="0" y="0"/>
+          <a:ext cx="0" cy="0"/>
+          <a:chOff x="0" y="0"/>
+          <a:chExt cx="0" cy="0"/>
+        </a:xfrm>
+      </p:grpSpPr>
+      <p:pic>
+        <p:nvPicPr>
+          <p:cNvPr id="3" name="Picture 2">
+            <a:extLst>
+              <a:ext uri="{FF2B5EF4-FFF2-40B4-BE49-F238E27FC236}">
+                <a16:creationId xmlns:a16="http://schemas.microsoft.com/office/drawing/2014/main" id="{48C14401-A4F5-4A02-86FB-4B129F566290}"/>
+              </a:ext>
+            </a:extLst>
+          </p:cNvPr>
+          <p:cNvPicPr>
+            <a:picLocks noChangeAspect="1"/>
+          </p:cNvPicPr>
+          <p:nvPr/>
+        </p:nvPicPr>
+        <p:blipFill>
+          <a:blip r:embed="rId2"/>
+          <a:stretch>
+            <a:fillRect/>
+          </a:stretch>
+        </p:blipFill>
+        <p:spPr>
+          <a:xfrm>
+            <a:off x="123469" y="566739"/>
+            <a:ext cx="10792770" cy="6201211"/>
+          </a:xfrm>
+          <a:prstGeom prst="rect">
+            <a:avLst/>
+          </a:prstGeom>
+        </p:spPr>
+      </p:pic>
+      <p:sp>
+        <p:nvSpPr>
+          <p:cNvPr id="4" name="Title 1">
+            <a:extLst>
+              <a:ext uri="{FF2B5EF4-FFF2-40B4-BE49-F238E27FC236}">
+                <a16:creationId xmlns:a16="http://schemas.microsoft.com/office/drawing/2014/main" id="{E028B486-695C-4154-BC81-03B9C67E3B40}"/>
+              </a:ext>
+            </a:extLst>
+          </p:cNvPr>
+          <p:cNvSpPr txBox="1">
+            <a:spLocks/>
+          </p:cNvSpPr>
+          <p:nvPr/>
+        </p:nvSpPr>
+        <p:spPr>
+          <a:xfrm>
+            <a:off x="327445" y="0"/>
+            <a:ext cx="10515600" cy="1133479"/>
+          </a:xfrm>
+          <a:prstGeom prst="rect">
+            <a:avLst/>
+          </a:prstGeom>
+        </p:spPr>
+        <p:txBody>
+          <a:bodyPr>
+            <a:normAutofit/>
+          </a:bodyPr>
+          <a:lstStyle>
+            <a:lvl1pPr algn="l" defTabSz="914377" rtl="0" eaLnBrk="1" latinLnBrk="0" hangingPunct="1">
+              <a:lnSpc>
+                <a:spcPct val="90000"/>
+              </a:lnSpc>
+              <a:spcBef>
+                <a:spcPct val="0"/>
+              </a:spcBef>
+              <a:buNone/>
+              <a:defRPr sz="4400" kern="1200">
+                <a:solidFill>
+                  <a:schemeClr val="tx1"/>
+                </a:solidFill>
+                <a:latin typeface="+mj-lt"/>
+                <a:ea typeface="+mj-ea"/>
+                <a:cs typeface="+mj-cs"/>
+              </a:defRPr>
+            </a:lvl1pPr>
+          </a:lstStyle>
+          <a:p>
+            <a:r>
+              <a:rPr lang="en-NZ" sz="3600" dirty="0"/>
+              <a:t>Common Data Model</a:t>
+            </a:r>
+          </a:p>
+        </p:txBody>
+      </p:sp>
+    </p:spTree>
+    <p:extLst>
+      <p:ext uri="{BB962C8B-B14F-4D97-AF65-F5344CB8AC3E}">
+        <p14:creationId xmlns:p14="http://schemas.microsoft.com/office/powerpoint/2010/main" val="2854383720"/>
+      </p:ext>
+    </p:extLst>
+  </p:cSld>
+  <p:clrMapOvr>
+    <a:masterClrMapping/>
+  </p:clrMapOvr>
+</p:sld>
+</file>
+
+<file path=ppt/slides/slide7.xml><?xml version="1.0" encoding="utf-8"?>
+<p:sld xmlns:a="http://schemas.openxmlformats.org/drawingml/2006/main" xmlns:r="http://schemas.openxmlformats.org/officeDocument/2006/relationships" xmlns:p="http://schemas.openxmlformats.org/presentationml/2006/main">
+  <p:cSld>
+    <p:spTree>
+      <p:nvGrpSpPr>
+        <p:cNvPr id="1" name=""/>
+        <p:cNvGrpSpPr/>
+        <p:nvPr/>
+      </p:nvGrpSpPr>
+      <p:grpSpPr>
+        <a:xfrm>
+          <a:off x="0" y="0"/>
+          <a:ext cx="0" cy="0"/>
+          <a:chOff x="0" y="0"/>
+          <a:chExt cx="0" cy="0"/>
+        </a:xfrm>
+      </p:grpSpPr>
+      <p:sp>
+        <p:nvSpPr>
+          <p:cNvPr id="3" name="Title 1">
+            <a:extLst>
+              <a:ext uri="{FF2B5EF4-FFF2-40B4-BE49-F238E27FC236}">
+                <a16:creationId xmlns:a16="http://schemas.microsoft.com/office/drawing/2014/main" id="{4DFA061C-FFA6-442F-8EEF-89F3C52841B8}"/>
+              </a:ext>
+            </a:extLst>
+          </p:cNvPr>
+          <p:cNvSpPr txBox="1">
+            <a:spLocks/>
+          </p:cNvSpPr>
+          <p:nvPr/>
+        </p:nvSpPr>
+        <p:spPr>
+          <a:xfrm>
+            <a:off x="838200" y="262970"/>
+            <a:ext cx="10515600" cy="1325563"/>
+          </a:xfrm>
+          <a:prstGeom prst="rect">
+            <a:avLst/>
+          </a:prstGeom>
+        </p:spPr>
+        <p:txBody>
+          <a:bodyPr/>
+          <a:lstStyle>
+            <a:lvl1pPr algn="l" defTabSz="914377" rtl="0" eaLnBrk="1" latinLnBrk="0" hangingPunct="1">
+              <a:lnSpc>
+                <a:spcPct val="90000"/>
+              </a:lnSpc>
+              <a:spcBef>
+                <a:spcPct val="0"/>
+              </a:spcBef>
+              <a:buNone/>
+              <a:defRPr sz="4400" kern="1200">
+                <a:solidFill>
+                  <a:schemeClr val="tx1"/>
+                </a:solidFill>
+                <a:latin typeface="+mj-lt"/>
+                <a:ea typeface="+mj-ea"/>
+                <a:cs typeface="+mj-cs"/>
+              </a:defRPr>
+            </a:lvl1pPr>
+          </a:lstStyle>
+          <a:p>
+            <a:r>
+              <a:rPr lang="en-NZ" dirty="0"/>
+              <a:t>Dynamics 365 Paradigm</a:t>
+            </a:r>
+            <a:endParaRPr lang="en-US" dirty="0"/>
+          </a:p>
+        </p:txBody>
+      </p:sp>
+      <p:sp>
+        <p:nvSpPr>
+          <p:cNvPr id="4" name="Content Placeholder 2">
+            <a:extLst>
+              <a:ext uri="{FF2B5EF4-FFF2-40B4-BE49-F238E27FC236}">
+                <a16:creationId xmlns:a16="http://schemas.microsoft.com/office/drawing/2014/main" id="{402CC66D-31A9-4275-9371-4894D5EB0783}"/>
+              </a:ext>
+            </a:extLst>
+          </p:cNvPr>
+          <p:cNvSpPr txBox="1">
+            <a:spLocks/>
+          </p:cNvSpPr>
+          <p:nvPr/>
+        </p:nvSpPr>
+        <p:spPr>
+          <a:xfrm>
+            <a:off x="838200" y="2051870"/>
+            <a:ext cx="5775664" cy="4351338"/>
+          </a:xfrm>
+          <a:prstGeom prst="rect">
+            <a:avLst/>
+          </a:prstGeom>
+        </p:spPr>
+        <p:txBody>
+          <a:bodyPr>
+            <a:normAutofit/>
+          </a:bodyPr>
+          <a:lstStyle>
+            <a:lvl1pPr marL="228594" indent="-228594" algn="l" defTabSz="914377" rtl="0" eaLnBrk="1" latinLnBrk="0" hangingPunct="1">
+              <a:lnSpc>
+                <a:spcPct val="90000"/>
+              </a:lnSpc>
+              <a:spcBef>
+                <a:spcPts val="1000"/>
+              </a:spcBef>
+              <a:buFont typeface="Arial" panose="020B0604020202020204" pitchFamily="34" charset="0"/>
+              <a:buChar char="•"/>
+              <a:defRPr sz="2800" kern="1200">
+                <a:solidFill>
+                  <a:schemeClr val="tx1"/>
+                </a:solidFill>
+                <a:latin typeface="+mn-lt"/>
+                <a:ea typeface="+mn-ea"/>
+                <a:cs typeface="+mn-cs"/>
+              </a:defRPr>
+            </a:lvl1pPr>
+            <a:lvl2pPr marL="685783" indent="-228594" algn="l" defTabSz="914377" rtl="0" eaLnBrk="1" latinLnBrk="0" hangingPunct="1">
+              <a:lnSpc>
+                <a:spcPct val="90000"/>
+              </a:lnSpc>
+              <a:spcBef>
+                <a:spcPts val="500"/>
+              </a:spcBef>
+              <a:buFont typeface="Arial" panose="020B0604020202020204" pitchFamily="34" charset="0"/>
+              <a:buChar char="•"/>
+              <a:defRPr sz="2400" kern="1200">
+                <a:solidFill>
+                  <a:schemeClr val="tx1"/>
+                </a:solidFill>
+                <a:latin typeface="+mn-lt"/>
+                <a:ea typeface="+mn-ea"/>
+                <a:cs typeface="+mn-cs"/>
+              </a:defRPr>
+            </a:lvl2pPr>
+            <a:lvl3pPr marL="1142971" indent="-228594" algn="l" defTabSz="914377" rtl="0" eaLnBrk="1" latinLnBrk="0" hangingPunct="1">
+              <a:lnSpc>
+                <a:spcPct val="90000"/>
+              </a:lnSpc>
+              <a:spcBef>
+                <a:spcPts val="500"/>
+              </a:spcBef>
+              <a:buFont typeface="Arial" panose="020B0604020202020204" pitchFamily="34" charset="0"/>
+              <a:buChar char="•"/>
+              <a:defRPr sz="2000" kern="1200">
+                <a:solidFill>
+                  <a:schemeClr val="tx1"/>
+                </a:solidFill>
+                <a:latin typeface="+mn-lt"/>
+                <a:ea typeface="+mn-ea"/>
+                <a:cs typeface="+mn-cs"/>
+              </a:defRPr>
+            </a:lvl3pPr>
+            <a:lvl4pPr marL="1600160" indent="-228594" algn="l" defTabSz="914377" rtl="0" eaLnBrk="1" latinLnBrk="0" hangingPunct="1">
+              <a:lnSpc>
+                <a:spcPct val="90000"/>
+              </a:lnSpc>
+              <a:spcBef>
+                <a:spcPts val="500"/>
+              </a:spcBef>
+              <a:buFont typeface="Arial" panose="020B0604020202020204" pitchFamily="34" charset="0"/>
+              <a:buChar char="•"/>
+              <a:defRPr sz="1800" kern="1200">
+                <a:solidFill>
+                  <a:schemeClr val="tx1"/>
+                </a:solidFill>
+                <a:latin typeface="+mn-lt"/>
+                <a:ea typeface="+mn-ea"/>
+                <a:cs typeface="+mn-cs"/>
+              </a:defRPr>
+            </a:lvl4pPr>
+            <a:lvl5pPr marL="2057349" indent="-228594" algn="l" defTabSz="914377" rtl="0" eaLnBrk="1" latinLnBrk="0" hangingPunct="1">
+              <a:lnSpc>
+                <a:spcPct val="90000"/>
+              </a:lnSpc>
+              <a:spcBef>
+                <a:spcPts val="500"/>
+              </a:spcBef>
+              <a:buFont typeface="Arial" panose="020B0604020202020204" pitchFamily="34" charset="0"/>
+              <a:buChar char="•"/>
+              <a:defRPr sz="1800" kern="1200">
+                <a:solidFill>
+                  <a:schemeClr val="tx1"/>
+                </a:solidFill>
+                <a:latin typeface="+mn-lt"/>
+                <a:ea typeface="+mn-ea"/>
+                <a:cs typeface="+mn-cs"/>
+              </a:defRPr>
+            </a:lvl5pPr>
+            <a:lvl6pPr marL="2514537" indent="-228594" algn="l" defTabSz="914377" rtl="0" eaLnBrk="1" latinLnBrk="0" hangingPunct="1">
+              <a:lnSpc>
+                <a:spcPct val="90000"/>
+              </a:lnSpc>
+              <a:spcBef>
+                <a:spcPts val="500"/>
+              </a:spcBef>
+              <a:buFont typeface="Arial" panose="020B0604020202020204" pitchFamily="34" charset="0"/>
+              <a:buChar char="•"/>
+              <a:defRPr sz="1800" kern="1200">
+                <a:solidFill>
+                  <a:schemeClr val="tx1"/>
+                </a:solidFill>
+                <a:latin typeface="+mn-lt"/>
+                <a:ea typeface="+mn-ea"/>
+                <a:cs typeface="+mn-cs"/>
+              </a:defRPr>
+            </a:lvl6pPr>
+            <a:lvl7pPr marL="2971726" indent="-228594" algn="l" defTabSz="914377" rtl="0" eaLnBrk="1" latinLnBrk="0" hangingPunct="1">
+              <a:lnSpc>
+                <a:spcPct val="90000"/>
+              </a:lnSpc>
+              <a:spcBef>
+                <a:spcPts val="500"/>
+              </a:spcBef>
+              <a:buFont typeface="Arial" panose="020B0604020202020204" pitchFamily="34" charset="0"/>
+              <a:buChar char="•"/>
+              <a:defRPr sz="1800" kern="1200">
+                <a:solidFill>
+                  <a:schemeClr val="tx1"/>
+                </a:solidFill>
+                <a:latin typeface="+mn-lt"/>
+                <a:ea typeface="+mn-ea"/>
+                <a:cs typeface="+mn-cs"/>
+              </a:defRPr>
+            </a:lvl7pPr>
+            <a:lvl8pPr marL="3428914" indent="-228594" algn="l" defTabSz="914377" rtl="0" eaLnBrk="1" latinLnBrk="0" hangingPunct="1">
+              <a:lnSpc>
+                <a:spcPct val="90000"/>
+              </a:lnSpc>
+              <a:spcBef>
+                <a:spcPts val="500"/>
+              </a:spcBef>
+              <a:buFont typeface="Arial" panose="020B0604020202020204" pitchFamily="34" charset="0"/>
+              <a:buChar char="•"/>
+              <a:defRPr sz="1800" kern="1200">
+                <a:solidFill>
+                  <a:schemeClr val="tx1"/>
+                </a:solidFill>
+                <a:latin typeface="+mn-lt"/>
+                <a:ea typeface="+mn-ea"/>
+                <a:cs typeface="+mn-cs"/>
+              </a:defRPr>
+            </a:lvl8pPr>
+            <a:lvl9pPr marL="3886103" indent="-228594" algn="l" defTabSz="914377" rtl="0" eaLnBrk="1" latinLnBrk="0" hangingPunct="1">
+              <a:lnSpc>
+                <a:spcPct val="90000"/>
+              </a:lnSpc>
+              <a:spcBef>
+                <a:spcPts val="500"/>
+              </a:spcBef>
+              <a:buFont typeface="Arial" panose="020B0604020202020204" pitchFamily="34" charset="0"/>
+              <a:buChar char="•"/>
+              <a:defRPr sz="1800" kern="1200">
+                <a:solidFill>
+                  <a:schemeClr val="tx1"/>
+                </a:solidFill>
+                <a:latin typeface="+mn-lt"/>
+                <a:ea typeface="+mn-ea"/>
+                <a:cs typeface="+mn-cs"/>
+              </a:defRPr>
+            </a:lvl9pPr>
+          </a:lstStyle>
+          <a:p>
+            <a:r>
+              <a:rPr lang="en-NZ" dirty="0">
+                <a:solidFill>
+                  <a:schemeClr val="accent1"/>
+                </a:solidFill>
+              </a:rPr>
+              <a:t>Dynamics 365 Sales</a:t>
+            </a:r>
+          </a:p>
+          <a:p>
+            <a:r>
+              <a:rPr lang="en-NZ" dirty="0">
+                <a:solidFill>
+                  <a:schemeClr val="accent1"/>
+                </a:solidFill>
+              </a:rPr>
+              <a:t>Dynamics 365 Customer Service</a:t>
+            </a:r>
+          </a:p>
+          <a:p>
+            <a:r>
+              <a:rPr lang="en-NZ" dirty="0">
+                <a:solidFill>
+                  <a:schemeClr val="accent1"/>
+                </a:solidFill>
+              </a:rPr>
+              <a:t>Dynamics 365 Field Service</a:t>
+            </a:r>
+          </a:p>
+          <a:p>
+            <a:r>
+              <a:rPr lang="en-NZ" dirty="0">
+                <a:solidFill>
+                  <a:schemeClr val="accent1"/>
+                </a:solidFill>
+              </a:rPr>
+              <a:t>Dynamics 365 Marketing</a:t>
+            </a:r>
+          </a:p>
+          <a:p>
+            <a:r>
+              <a:rPr lang="en-NZ" dirty="0">
+                <a:solidFill>
+                  <a:schemeClr val="accent1"/>
+                </a:solidFill>
+              </a:rPr>
+              <a:t>Dynamics 365 Talent</a:t>
+            </a:r>
+          </a:p>
+          <a:p>
+            <a:r>
+              <a:rPr lang="en-NZ" dirty="0">
+                <a:solidFill>
+                  <a:schemeClr val="accent1"/>
+                </a:solidFill>
+              </a:rPr>
+              <a:t>Forms Pro</a:t>
+            </a:r>
+          </a:p>
+          <a:p>
+            <a:r>
+              <a:rPr lang="en-NZ" dirty="0">
+                <a:solidFill>
+                  <a:schemeClr val="accent1"/>
+                </a:solidFill>
+              </a:rPr>
+              <a:t>…..</a:t>
+            </a:r>
+          </a:p>
+          <a:p>
+            <a:pPr marL="0" indent="0">
+              <a:buFont typeface="Arial" panose="020B0604020202020204" pitchFamily="34" charset="0"/>
+              <a:buNone/>
+            </a:pPr>
+            <a:endParaRPr lang="en-NZ" dirty="0">
+              <a:solidFill>
+                <a:schemeClr val="accent1"/>
+              </a:solidFill>
+            </a:endParaRPr>
+          </a:p>
+          <a:p>
+            <a:endParaRPr lang="en-NZ" dirty="0">
+              <a:solidFill>
+                <a:schemeClr val="accent1"/>
+              </a:solidFill>
+            </a:endParaRPr>
+          </a:p>
+          <a:p>
+            <a:endParaRPr lang="en-NZ" dirty="0">
+              <a:solidFill>
+                <a:schemeClr val="accent1"/>
+              </a:solidFill>
+            </a:endParaRPr>
+          </a:p>
+        </p:txBody>
+      </p:sp>
+      <p:sp>
+        <p:nvSpPr>
+          <p:cNvPr id="5" name="Right Brace 4">
+            <a:extLst>
+              <a:ext uri="{FF2B5EF4-FFF2-40B4-BE49-F238E27FC236}">
+                <a16:creationId xmlns:a16="http://schemas.microsoft.com/office/drawing/2014/main" id="{DD071BE7-3A94-47C6-B132-AABC28C206D2}"/>
+              </a:ext>
+            </a:extLst>
+          </p:cNvPr>
+          <p:cNvSpPr/>
+          <p:nvPr/>
+        </p:nvSpPr>
+        <p:spPr>
+          <a:xfrm>
+            <a:off x="6344816" y="1903445"/>
+            <a:ext cx="886408" cy="4170784"/>
+          </a:xfrm>
+          <a:prstGeom prst="rightBrace">
+            <a:avLst/>
+          </a:prstGeom>
+          <a:ln w="19050">
+            <a:solidFill>
+              <a:schemeClr val="tx1"/>
+            </a:solidFill>
+          </a:ln>
+        </p:spPr>
+        <p:style>
+          <a:lnRef idx="1">
+            <a:schemeClr val="accent1"/>
+          </a:lnRef>
+          <a:fillRef idx="0">
+            <a:schemeClr val="accent1"/>
+          </a:fillRef>
+          <a:effectRef idx="0">
+            <a:schemeClr val="accent1"/>
+          </a:effectRef>
+          <a:fontRef idx="minor">
+            <a:schemeClr val="tx1"/>
+          </a:fontRef>
+        </p:style>
+        <p:txBody>
+          <a:bodyPr rtlCol="0" anchor="ctr"/>
+          <a:lstStyle/>
+          <a:p>
+            <a:pPr algn="ctr"/>
+            <a:endParaRPr lang="en-US"/>
+          </a:p>
+        </p:txBody>
+      </p:sp>
+      <p:sp>
+        <p:nvSpPr>
+          <p:cNvPr id="6" name="Rectangle 5">
+            <a:extLst>
+              <a:ext uri="{FF2B5EF4-FFF2-40B4-BE49-F238E27FC236}">
+                <a16:creationId xmlns:a16="http://schemas.microsoft.com/office/drawing/2014/main" id="{FA1147C4-6AB5-4089-84A4-E349FC2ED50D}"/>
+              </a:ext>
+            </a:extLst>
+          </p:cNvPr>
+          <p:cNvSpPr/>
+          <p:nvPr/>
+        </p:nvSpPr>
+        <p:spPr>
+          <a:xfrm>
+            <a:off x="7773163" y="3710865"/>
+            <a:ext cx="3679918" cy="400110"/>
+          </a:xfrm>
+          <a:prstGeom prst="rect">
+            <a:avLst/>
+          </a:prstGeom>
+        </p:spPr>
+        <p:txBody>
+          <a:bodyPr wrap="none">
+            <a:spAutoFit/>
+          </a:bodyPr>
+          <a:lstStyle/>
+          <a:p>
+            <a:r>
+              <a:rPr lang="en-NZ" sz="2000" dirty="0">
+                <a:solidFill>
+                  <a:schemeClr val="accent1"/>
+                </a:solidFill>
+              </a:rPr>
+              <a:t>1</a:t>
+            </a:r>
+            <a:r>
+              <a:rPr lang="en-NZ" sz="2000" baseline="30000" dirty="0">
+                <a:solidFill>
+                  <a:schemeClr val="accent1"/>
+                </a:solidFill>
+              </a:rPr>
+              <a:t>st</a:t>
+            </a:r>
+            <a:r>
+              <a:rPr lang="en-NZ" sz="2000" dirty="0">
+                <a:solidFill>
+                  <a:schemeClr val="accent1"/>
+                </a:solidFill>
+              </a:rPr>
+              <a:t> party apps built on top of CDS</a:t>
+            </a:r>
+          </a:p>
+        </p:txBody>
+      </p:sp>
+    </p:spTree>
+    <p:extLst>
+      <p:ext uri="{BB962C8B-B14F-4D97-AF65-F5344CB8AC3E}">
+        <p14:creationId xmlns:p14="http://schemas.microsoft.com/office/powerpoint/2010/main" val="1932433251"/>
+      </p:ext>
+    </p:extLst>
+  </p:cSld>
+  <p:clrMapOvr>
+    <a:masterClrMapping/>
+  </p:clrMapOvr>
+</p:sld>
+</file>
+
+<file path=ppt/slides/slide8.xml><?xml version="1.0" encoding="utf-8"?>
+<p:sld xmlns:a="http://schemas.openxmlformats.org/drawingml/2006/main" xmlns:r="http://schemas.openxmlformats.org/officeDocument/2006/relationships" xmlns:p="http://schemas.openxmlformats.org/presentationml/2006/main">
+  <p:cSld>
+    <p:spTree>
+      <p:nvGrpSpPr>
+        <p:cNvPr id="1" name=""/>
+        <p:cNvGrpSpPr/>
+        <p:nvPr/>
+      </p:nvGrpSpPr>
+      <p:grpSpPr>
+        <a:xfrm>
+          <a:off x="0" y="0"/>
+          <a:ext cx="0" cy="0"/>
+          <a:chOff x="0" y="0"/>
+          <a:chExt cx="0" cy="0"/>
+        </a:xfrm>
+      </p:grpSpPr>
+      <p:sp>
+        <p:nvSpPr>
+          <p:cNvPr id="4" name="Title 1">
+            <a:extLst>
+              <a:ext uri="{FF2B5EF4-FFF2-40B4-BE49-F238E27FC236}">
+                <a16:creationId xmlns:a16="http://schemas.microsoft.com/office/drawing/2014/main" id="{E434059F-0404-439B-9BFB-B59AC9544458}"/>
+              </a:ext>
+            </a:extLst>
+          </p:cNvPr>
+          <p:cNvSpPr txBox="1">
+            <a:spLocks/>
+          </p:cNvSpPr>
+          <p:nvPr/>
+        </p:nvSpPr>
+        <p:spPr>
+          <a:xfrm>
+            <a:off x="1573491" y="2975869"/>
+            <a:ext cx="10515600" cy="2695316"/>
+          </a:xfrm>
+          <a:prstGeom prst="rect">
+            <a:avLst/>
+          </a:prstGeom>
+        </p:spPr>
+        <p:txBody>
+          <a:bodyPr>
+            <a:normAutofit fontScale="92500" lnSpcReduction="10000"/>
+          </a:bodyPr>
+          <a:lstStyle>
+            <a:lvl1pPr algn="l" defTabSz="914377" rtl="0" eaLnBrk="1" latinLnBrk="0" hangingPunct="1">
+              <a:lnSpc>
+                <a:spcPct val="90000"/>
+              </a:lnSpc>
+              <a:spcBef>
+                <a:spcPct val="0"/>
+              </a:spcBef>
+              <a:buNone/>
+              <a:defRPr sz="4400" kern="1200">
+                <a:solidFill>
+                  <a:schemeClr val="tx1"/>
+                </a:solidFill>
+                <a:latin typeface="+mj-lt"/>
+                <a:ea typeface="+mj-ea"/>
+                <a:cs typeface="+mj-cs"/>
+              </a:defRPr>
+            </a:lvl1pPr>
+          </a:lstStyle>
+          <a:p>
+            <a:r>
+              <a:rPr lang="en-NZ" sz="7200" dirty="0"/>
+              <a:t>Demo!</a:t>
+            </a:r>
+            <a:br>
+              <a:rPr lang="en-NZ" sz="7200" dirty="0"/>
+            </a:br>
+            <a:br>
+              <a:rPr lang="en-NZ" sz="7200" dirty="0"/>
+            </a:br>
+            <a:endParaRPr lang="en-US" sz="7200" dirty="0"/>
+          </a:p>
+        </p:txBody>
+      </p:sp>
+    </p:spTree>
+    <p:extLst>
+      <p:ext uri="{BB962C8B-B14F-4D97-AF65-F5344CB8AC3E}">
+        <p14:creationId xmlns:p14="http://schemas.microsoft.com/office/powerpoint/2010/main" val="126062860"/>
+      </p:ext>
+    </p:extLst>
+  </p:cSld>
+  <p:clrMapOvr>
+    <a:masterClrMapping/>
+  </p:clrMapOvr>
+</p:sld>
+</file>
+
+<file path=ppt/slides/slide9.xml><?xml version="1.0" encoding="utf-8"?>
+<p:sld xmlns:a="http://schemas.openxmlformats.org/drawingml/2006/main" xmlns:r="http://schemas.openxmlformats.org/officeDocument/2006/relationships" xmlns:p="http://schemas.openxmlformats.org/presentationml/2006/main">
+  <p:cSld>
+    <p:spTree>
+      <p:nvGrpSpPr>
+        <p:cNvPr id="1" name=""/>
+        <p:cNvGrpSpPr/>
+        <p:nvPr/>
+      </p:nvGrpSpPr>
+      <p:grpSpPr>
+        <a:xfrm>
+          <a:off x="0" y="0"/>
+          <a:ext cx="0" cy="0"/>
+          <a:chOff x="0" y="0"/>
+          <a:chExt cx="0" cy="0"/>
+        </a:xfrm>
+      </p:grpSpPr>
+      <p:sp>
+        <p:nvSpPr>
+          <p:cNvPr id="3" name="Title 1">
+            <a:extLst>
+              <a:ext uri="{FF2B5EF4-FFF2-40B4-BE49-F238E27FC236}">
+                <a16:creationId xmlns:a16="http://schemas.microsoft.com/office/drawing/2014/main" id="{DEDCEFAE-AEC3-4293-966B-BA3D05C8EF50}"/>
+              </a:ext>
+            </a:extLst>
+          </p:cNvPr>
+          <p:cNvSpPr txBox="1">
+            <a:spLocks/>
+          </p:cNvSpPr>
+          <p:nvPr/>
+        </p:nvSpPr>
+        <p:spPr>
+          <a:xfrm>
+            <a:off x="838200" y="365125"/>
+            <a:ext cx="10515600" cy="1325563"/>
+          </a:xfrm>
+          <a:prstGeom prst="rect">
+            <a:avLst/>
+          </a:prstGeom>
+        </p:spPr>
+        <p:txBody>
+          <a:bodyPr/>
+          <a:lstStyle>
+            <a:lvl1pPr algn="l" defTabSz="914377" rtl="0" eaLnBrk="1" latinLnBrk="0" hangingPunct="1">
+              <a:lnSpc>
+                <a:spcPct val="90000"/>
+              </a:lnSpc>
+              <a:spcBef>
+                <a:spcPct val="0"/>
+              </a:spcBef>
+              <a:buNone/>
+              <a:defRPr sz="4400" kern="1200">
+                <a:solidFill>
+                  <a:schemeClr val="tx1"/>
+                </a:solidFill>
+                <a:latin typeface="+mj-lt"/>
+                <a:ea typeface="+mj-ea"/>
+                <a:cs typeface="+mj-cs"/>
+              </a:defRPr>
+            </a:lvl1pPr>
+          </a:lstStyle>
+          <a:p>
+            <a:r>
+              <a:rPr lang="en-NZ" sz="4800" dirty="0"/>
+              <a:t>Dataflows Overview</a:t>
+            </a:r>
+            <a:endParaRPr lang="en-US" sz="4800" dirty="0"/>
+          </a:p>
+        </p:txBody>
+      </p:sp>
+      <p:sp>
+        <p:nvSpPr>
+          <p:cNvPr id="4" name="Content Placeholder 2">
+            <a:extLst>
+              <a:ext uri="{FF2B5EF4-FFF2-40B4-BE49-F238E27FC236}">
+                <a16:creationId xmlns:a16="http://schemas.microsoft.com/office/drawing/2014/main" id="{654E4040-DA01-4E5D-BCA5-C7D5965DC7DB}"/>
+              </a:ext>
+            </a:extLst>
+          </p:cNvPr>
+          <p:cNvSpPr txBox="1">
+            <a:spLocks/>
+          </p:cNvSpPr>
+          <p:nvPr/>
+        </p:nvSpPr>
+        <p:spPr>
+          <a:xfrm>
+            <a:off x="838200" y="1825625"/>
+            <a:ext cx="10515600" cy="4351338"/>
+          </a:xfrm>
+          <a:prstGeom prst="rect">
+            <a:avLst/>
+          </a:prstGeom>
+        </p:spPr>
+        <p:txBody>
+          <a:bodyPr/>
+          <a:lstStyle>
+            <a:lvl1pPr marL="228594" indent="-228594" algn="l" defTabSz="914377" rtl="0" eaLnBrk="1" latinLnBrk="0" hangingPunct="1">
+              <a:lnSpc>
+                <a:spcPct val="90000"/>
+              </a:lnSpc>
+              <a:spcBef>
+                <a:spcPts val="1000"/>
+              </a:spcBef>
+              <a:buFont typeface="Arial" panose="020B0604020202020204" pitchFamily="34" charset="0"/>
+              <a:buChar char="•"/>
+              <a:defRPr sz="2800" kern="1200">
+                <a:solidFill>
+                  <a:schemeClr val="tx1"/>
+                </a:solidFill>
+                <a:latin typeface="+mn-lt"/>
+                <a:ea typeface="+mn-ea"/>
+                <a:cs typeface="+mn-cs"/>
+              </a:defRPr>
+            </a:lvl1pPr>
+            <a:lvl2pPr marL="685783" indent="-228594" algn="l" defTabSz="914377" rtl="0" eaLnBrk="1" latinLnBrk="0" hangingPunct="1">
+              <a:lnSpc>
+                <a:spcPct val="90000"/>
+              </a:lnSpc>
+              <a:spcBef>
+                <a:spcPts val="500"/>
+              </a:spcBef>
+              <a:buFont typeface="Arial" panose="020B0604020202020204" pitchFamily="34" charset="0"/>
+              <a:buChar char="•"/>
+              <a:defRPr sz="2400" kern="1200">
+                <a:solidFill>
+                  <a:schemeClr val="tx1"/>
+                </a:solidFill>
+                <a:latin typeface="+mn-lt"/>
+                <a:ea typeface="+mn-ea"/>
+                <a:cs typeface="+mn-cs"/>
+              </a:defRPr>
+            </a:lvl2pPr>
+            <a:lvl3pPr marL="1142971" indent="-228594" algn="l" defTabSz="914377" rtl="0" eaLnBrk="1" latinLnBrk="0" hangingPunct="1">
+              <a:lnSpc>
+                <a:spcPct val="90000"/>
+              </a:lnSpc>
+              <a:spcBef>
+                <a:spcPts val="500"/>
+              </a:spcBef>
+              <a:buFont typeface="Arial" panose="020B0604020202020204" pitchFamily="34" charset="0"/>
+              <a:buChar char="•"/>
+              <a:defRPr sz="2000" kern="1200">
+                <a:solidFill>
+                  <a:schemeClr val="tx1"/>
+                </a:solidFill>
+                <a:latin typeface="+mn-lt"/>
+                <a:ea typeface="+mn-ea"/>
+                <a:cs typeface="+mn-cs"/>
+              </a:defRPr>
+            </a:lvl3pPr>
+            <a:lvl4pPr marL="1600160" indent="-228594" algn="l" defTabSz="914377" rtl="0" eaLnBrk="1" latinLnBrk="0" hangingPunct="1">
+              <a:lnSpc>
+                <a:spcPct val="90000"/>
+              </a:lnSpc>
+              <a:spcBef>
+                <a:spcPts val="500"/>
+              </a:spcBef>
+              <a:buFont typeface="Arial" panose="020B0604020202020204" pitchFamily="34" charset="0"/>
+              <a:buChar char="•"/>
+              <a:defRPr sz="1800" kern="1200">
+                <a:solidFill>
+                  <a:schemeClr val="tx1"/>
+                </a:solidFill>
+                <a:latin typeface="+mn-lt"/>
+                <a:ea typeface="+mn-ea"/>
+                <a:cs typeface="+mn-cs"/>
+              </a:defRPr>
+            </a:lvl4pPr>
+            <a:lvl5pPr marL="2057349" indent="-228594" algn="l" defTabSz="914377" rtl="0" eaLnBrk="1" latinLnBrk="0" hangingPunct="1">
+              <a:lnSpc>
+                <a:spcPct val="90000"/>
+              </a:lnSpc>
+              <a:spcBef>
+                <a:spcPts val="500"/>
+              </a:spcBef>
+              <a:buFont typeface="Arial" panose="020B0604020202020204" pitchFamily="34" charset="0"/>
+              <a:buChar char="•"/>
+              <a:defRPr sz="1800" kern="1200">
+                <a:solidFill>
+                  <a:schemeClr val="tx1"/>
+                </a:solidFill>
+                <a:latin typeface="+mn-lt"/>
+                <a:ea typeface="+mn-ea"/>
+                <a:cs typeface="+mn-cs"/>
+              </a:defRPr>
+            </a:lvl5pPr>
+            <a:lvl6pPr marL="2514537" indent="-228594" algn="l" defTabSz="914377" rtl="0" eaLnBrk="1" latinLnBrk="0" hangingPunct="1">
+              <a:lnSpc>
+                <a:spcPct val="90000"/>
+              </a:lnSpc>
+              <a:spcBef>
+                <a:spcPts val="500"/>
+              </a:spcBef>
+              <a:buFont typeface="Arial" panose="020B0604020202020204" pitchFamily="34" charset="0"/>
+              <a:buChar char="•"/>
+              <a:defRPr sz="1800" kern="1200">
+                <a:solidFill>
+                  <a:schemeClr val="tx1"/>
+                </a:solidFill>
+                <a:latin typeface="+mn-lt"/>
+                <a:ea typeface="+mn-ea"/>
+                <a:cs typeface="+mn-cs"/>
+              </a:defRPr>
+            </a:lvl6pPr>
+            <a:lvl7pPr marL="2971726" indent="-228594" algn="l" defTabSz="914377" rtl="0" eaLnBrk="1" latinLnBrk="0" hangingPunct="1">
+              <a:lnSpc>
+                <a:spcPct val="90000"/>
+              </a:lnSpc>
+              <a:spcBef>
+                <a:spcPts val="500"/>
+              </a:spcBef>
+              <a:buFont typeface="Arial" panose="020B0604020202020204" pitchFamily="34" charset="0"/>
+              <a:buChar char="•"/>
+              <a:defRPr sz="1800" kern="1200">
+                <a:solidFill>
+                  <a:schemeClr val="tx1"/>
+                </a:solidFill>
+                <a:latin typeface="+mn-lt"/>
+                <a:ea typeface="+mn-ea"/>
+                <a:cs typeface="+mn-cs"/>
+              </a:defRPr>
+            </a:lvl7pPr>
+            <a:lvl8pPr marL="3428914" indent="-228594" algn="l" defTabSz="914377" rtl="0" eaLnBrk="1" latinLnBrk="0" hangingPunct="1">
+              <a:lnSpc>
+                <a:spcPct val="90000"/>
+              </a:lnSpc>
+              <a:spcBef>
+                <a:spcPts val="500"/>
+              </a:spcBef>
+              <a:buFont typeface="Arial" panose="020B0604020202020204" pitchFamily="34" charset="0"/>
+              <a:buChar char="•"/>
+              <a:defRPr sz="1800" kern="1200">
+                <a:solidFill>
+                  <a:schemeClr val="tx1"/>
+                </a:solidFill>
+                <a:latin typeface="+mn-lt"/>
+                <a:ea typeface="+mn-ea"/>
+                <a:cs typeface="+mn-cs"/>
+              </a:defRPr>
+            </a:lvl8pPr>
+            <a:lvl9pPr marL="3886103" indent="-228594" algn="l" defTabSz="914377" rtl="0" eaLnBrk="1" latinLnBrk="0" hangingPunct="1">
+              <a:lnSpc>
+                <a:spcPct val="90000"/>
+              </a:lnSpc>
+              <a:spcBef>
+                <a:spcPts val="500"/>
+              </a:spcBef>
+              <a:buFont typeface="Arial" panose="020B0604020202020204" pitchFamily="34" charset="0"/>
+              <a:buChar char="•"/>
+              <a:defRPr sz="1800" kern="1200">
+                <a:solidFill>
+                  <a:schemeClr val="tx1"/>
+                </a:solidFill>
+                <a:latin typeface="+mn-lt"/>
+                <a:ea typeface="+mn-ea"/>
+                <a:cs typeface="+mn-cs"/>
+              </a:defRPr>
+            </a:lvl9pPr>
+          </a:lstStyle>
+          <a:p>
+            <a:pPr marL="0" indent="0">
+              <a:buNone/>
+            </a:pPr>
+            <a:r>
+              <a:rPr lang="en-NZ" sz="3600" dirty="0">
+                <a:solidFill>
+                  <a:schemeClr val="accent1"/>
+                </a:solidFill>
+              </a:rPr>
+              <a:t>What we just saw:</a:t>
+            </a:r>
+          </a:p>
+          <a:p>
+            <a:pPr marL="0" indent="0">
+              <a:buNone/>
+            </a:pPr>
+            <a:endParaRPr lang="en-NZ" dirty="0">
+              <a:solidFill>
+                <a:schemeClr val="accent1"/>
+              </a:solidFill>
+            </a:endParaRPr>
+          </a:p>
+          <a:p>
+            <a:r>
+              <a:rPr lang="en-NZ" dirty="0">
+                <a:solidFill>
+                  <a:schemeClr val="accent1"/>
+                </a:solidFill>
+              </a:rPr>
+              <a:t>Unify your enterprise systems with no code</a:t>
+            </a:r>
+          </a:p>
+          <a:p>
+            <a:r>
+              <a:rPr lang="en-NZ" dirty="0">
+                <a:solidFill>
+                  <a:schemeClr val="accent1"/>
+                </a:solidFill>
+              </a:rPr>
+              <a:t>Reused existing data model and leverage CDS capabilities</a:t>
+            </a:r>
+          </a:p>
+          <a:p>
+            <a:r>
+              <a:rPr lang="en-NZ" dirty="0">
+                <a:solidFill>
+                  <a:schemeClr val="accent1"/>
+                </a:solidFill>
+              </a:rPr>
+              <a:t>Schedule runs or on demand</a:t>
+            </a:r>
+          </a:p>
+          <a:p>
+            <a:r>
+              <a:rPr lang="en-NZ" dirty="0">
+                <a:solidFill>
+                  <a:schemeClr val="accent1"/>
+                </a:solidFill>
+              </a:rPr>
+              <a:t>Export to Data Lake (Azure Data Lake Gen2)</a:t>
+            </a:r>
+          </a:p>
+          <a:p>
+            <a:pPr algn="r"/>
+            <a:endParaRPr lang="en-US" dirty="0">
+              <a:solidFill>
+                <a:schemeClr val="accent1"/>
+              </a:solidFill>
+            </a:endParaRPr>
+          </a:p>
+        </p:txBody>
+      </p:sp>
+    </p:spTree>
+    <p:extLst>
+      <p:ext uri="{BB962C8B-B14F-4D97-AF65-F5344CB8AC3E}">
+        <p14:creationId xmlns:p14="http://schemas.microsoft.com/office/powerpoint/2010/main" val="896282811"/>
       </p:ext>
     </p:extLst>
   </p:cSld>
@@ -4670,4 +7291,245 @@
     </a:ext>
   </a:extLst>
 </a:theme>
+</file>
+
+<file path=customXml/item1.xml><?xml version="1.0" encoding="utf-8"?>
+<p:properties xmlns:p="http://schemas.microsoft.com/office/2006/metadata/properties" xmlns:xsi="http://www.w3.org/2001/XMLSchema-instance" xmlns:pc="http://schemas.microsoft.com/office/infopath/2007/PartnerControls">
+  <documentManagement/>
+</p:properties>
+</file>
+
+<file path=customXml/item2.xml><?xml version="1.0" encoding="utf-8"?>
+<?mso-contentType ?>
+<FormTemplates xmlns="http://schemas.microsoft.com/sharepoint/v3/contenttype/forms">
+  <Display>DocumentLibraryForm</Display>
+  <Edit>DocumentLibraryForm</Edit>
+  <New>DocumentLibraryForm</New>
+</FormTemplates>
+</file>
+
+<file path=customXml/item3.xml><?xml version="1.0" encoding="utf-8"?>
+<ct:contentTypeSchema xmlns:ct="http://schemas.microsoft.com/office/2006/metadata/contentType" xmlns:ma="http://schemas.microsoft.com/office/2006/metadata/properties/metaAttributes" ct:_="" ma:_="" ma:contentTypeName="Document" ma:contentTypeID="0x01010010EF7779D0EDA448BB434F8220CDE93C" ma:contentTypeVersion="10" ma:contentTypeDescription="Create a new document." ma:contentTypeScope="" ma:versionID="bc4d64a2bc62fabd74f27c03ceea113b">
+  <xsd:schema xmlns:xsd="http://www.w3.org/2001/XMLSchema" xmlns:xs="http://www.w3.org/2001/XMLSchema" xmlns:p="http://schemas.microsoft.com/office/2006/metadata/properties" xmlns:ns3="92790b02-1a8a-46fa-8082-3f41ada6b8e7" targetNamespace="http://schemas.microsoft.com/office/2006/metadata/properties" ma:root="true" ma:fieldsID="5f755bf60604a6601469f6be7d122160" ns3:_="">
+    <xsd:import namespace="92790b02-1a8a-46fa-8082-3f41ada6b8e7"/>
+    <xsd:element name="properties">
+      <xsd:complexType>
+        <xsd:sequence>
+          <xsd:element name="documentManagement">
+            <xsd:complexType>
+              <xsd:all>
+                <xsd:element ref="ns3:MediaServiceMetadata" minOccurs="0"/>
+                <xsd:element ref="ns3:MediaServiceFastMetadata" minOccurs="0"/>
+                <xsd:element ref="ns3:MediaServiceAutoKeyPoints" minOccurs="0"/>
+                <xsd:element ref="ns3:MediaServiceKeyPoints" minOccurs="0"/>
+                <xsd:element ref="ns3:MediaServiceDateTaken" minOccurs="0"/>
+                <xsd:element ref="ns3:MediaServiceAutoTags" minOccurs="0"/>
+                <xsd:element ref="ns3:MediaServiceGenerationTime" minOccurs="0"/>
+                <xsd:element ref="ns3:MediaServiceEventHashCode" minOccurs="0"/>
+                <xsd:element ref="ns3:MediaServiceLocation" minOccurs="0"/>
+                <xsd:element ref="ns3:MediaServiceOCR" minOccurs="0"/>
+              </xsd:all>
+            </xsd:complexType>
+          </xsd:element>
+        </xsd:sequence>
+      </xsd:complexType>
+    </xsd:element>
+  </xsd:schema>
+  <xsd:schema xmlns:xsd="http://www.w3.org/2001/XMLSchema" xmlns:xs="http://www.w3.org/2001/XMLSchema" xmlns:dms="http://schemas.microsoft.com/office/2006/documentManagement/types" xmlns:pc="http://schemas.microsoft.com/office/infopath/2007/PartnerControls" targetNamespace="92790b02-1a8a-46fa-8082-3f41ada6b8e7" elementFormDefault="qualified">
+    <xsd:import namespace="http://schemas.microsoft.com/office/2006/documentManagement/types"/>
+    <xsd:import namespace="http://schemas.microsoft.com/office/infopath/2007/PartnerControls"/>
+    <xsd:element name="MediaServiceMetadata" ma:index="8" nillable="true" ma:displayName="MediaServiceMetadata" ma:hidden="true" ma:internalName="MediaServiceMetadata" ma:readOnly="true">
+      <xsd:simpleType>
+        <xsd:restriction base="dms:Note"/>
+      </xsd:simpleType>
+    </xsd:element>
+    <xsd:element name="MediaServiceFastMetadata" ma:index="9" nillable="true" ma:displayName="MediaServiceFastMetadata" ma:hidden="true" ma:internalName="MediaServiceFastMetadata" ma:readOnly="true">
+      <xsd:simpleType>
+        <xsd:restriction base="dms:Note"/>
+      </xsd:simpleType>
+    </xsd:element>
+    <xsd:element name="MediaServiceAutoKeyPoints" ma:index="10" nillable="true" ma:displayName="MediaServiceAutoKeyPoints" ma:hidden="true" ma:internalName="MediaServiceAutoKeyPoints" ma:readOnly="true">
+      <xsd:simpleType>
+        <xsd:restriction base="dms:Note"/>
+      </xsd:simpleType>
+    </xsd:element>
+    <xsd:element name="MediaServiceKeyPoints" ma:index="11" nillable="true" ma:displayName="KeyPoints" ma:internalName="MediaServiceKeyPoints" ma:readOnly="true">
+      <xsd:simpleType>
+        <xsd:restriction base="dms:Note">
+          <xsd:maxLength value="255"/>
+        </xsd:restriction>
+      </xsd:simpleType>
+    </xsd:element>
+    <xsd:element name="MediaServiceDateTaken" ma:index="12" nillable="true" ma:displayName="MediaServiceDateTaken" ma:hidden="true" ma:internalName="MediaServiceDateTaken" ma:readOnly="true">
+      <xsd:simpleType>
+        <xsd:restriction base="dms:Text"/>
+      </xsd:simpleType>
+    </xsd:element>
+    <xsd:element name="MediaServiceAutoTags" ma:index="13" nillable="true" ma:displayName="Tags" ma:internalName="MediaServiceAutoTags" ma:readOnly="true">
+      <xsd:simpleType>
+        <xsd:restriction base="dms:Text"/>
+      </xsd:simpleType>
+    </xsd:element>
+    <xsd:element name="MediaServiceGenerationTime" ma:index="14" nillable="true" ma:displayName="MediaServiceGenerationTime" ma:hidden="true" ma:internalName="MediaServiceGenerationTime" ma:readOnly="true">
+      <xsd:simpleType>
+        <xsd:restriction base="dms:Text"/>
+      </xsd:simpleType>
+    </xsd:element>
+    <xsd:element name="MediaServiceEventHashCode" ma:index="15" nillable="true" ma:displayName="MediaServiceEventHashCode" ma:hidden="true" ma:internalName="MediaServiceEventHashCode" ma:readOnly="true">
+      <xsd:simpleType>
+        <xsd:restriction base="dms:Text"/>
+      </xsd:simpleType>
+    </xsd:element>
+    <xsd:element name="MediaServiceLocation" ma:index="16" nillable="true" ma:displayName="Location" ma:internalName="MediaServiceLocation" ma:readOnly="true">
+      <xsd:simpleType>
+        <xsd:restriction base="dms:Text"/>
+      </xsd:simpleType>
+    </xsd:element>
+    <xsd:element name="MediaServiceOCR" ma:index="17" nillable="true" ma:displayName="Extracted Text" ma:internalName="MediaServiceOCR" ma:readOnly="true">
+      <xsd:simpleType>
+        <xsd:restriction base="dms:Note">
+          <xsd:maxLength value="255"/>
+        </xsd:restriction>
+      </xsd:simpleType>
+    </xsd:element>
+  </xsd:schema>
+  <xsd:schema xmlns="http://schemas.openxmlformats.org/package/2006/metadata/core-properties" xmlns:xsd="http://www.w3.org/2001/XMLSchema" xmlns:xsi="http://www.w3.org/2001/XMLSchema-instance" xmlns:dc="http://purl.org/dc/elements/1.1/" xmlns:dcterms="http://purl.org/dc/terms/" xmlns:odoc="http://schemas.microsoft.com/internal/obd" targetNamespace="http://schemas.openxmlformats.org/package/2006/metadata/core-properties" elementFormDefault="qualified" attributeFormDefault="unqualified" blockDefault="#all">
+    <xsd:import namespace="http://purl.org/dc/elements/1.1/" schemaLocation="http://dublincore.org/schemas/xmls/qdc/2003/04/02/dc.xsd"/>
+    <xsd:import namespace="http://purl.org/dc/terms/" schemaLocation="http://dublincore.org/schemas/xmls/qdc/2003/04/02/dcterms.xsd"/>
+    <xsd:element name="coreProperties" type="CT_coreProperties"/>
+    <xsd:complexType name="CT_coreProperties">
+      <xsd:all>
+        <xsd:element ref="dc:creator" minOccurs="0" maxOccurs="1"/>
+        <xsd:element ref="dcterms:created" minOccurs="0" maxOccurs="1"/>
+        <xsd:element ref="dc:identifier" minOccurs="0" maxOccurs="1"/>
+        <xsd:element name="contentType" minOccurs="0" maxOccurs="1" type="xsd:string" ma:index="0" ma:displayName="Content Type"/>
+        <xsd:element ref="dc:title" minOccurs="0" maxOccurs="1" ma:index="4" ma:displayName="Title"/>
+        <xsd:element ref="dc:subject" minOccurs="0" maxOccurs="1"/>
+        <xsd:element ref="dc:description" minOccurs="0" maxOccurs="1"/>
+        <xsd:element name="keywords" minOccurs="0" maxOccurs="1" type="xsd:string"/>
+        <xsd:element ref="dc:language" minOccurs="0" maxOccurs="1"/>
+        <xsd:element name="category" minOccurs="0" maxOccurs="1" type="xsd:string"/>
+        <xsd:element name="version" minOccurs="0" maxOccurs="1" type="xsd:string"/>
+        <xsd:element name="revision" minOccurs="0" maxOccurs="1" type="xsd:string">
+          <xsd:annotation>
+            <xsd:documentation>
+                        This value indicates the number of saves or revisions. The application is responsible for updating this value after each revision.
+                    </xsd:documentation>
+          </xsd:annotation>
+        </xsd:element>
+        <xsd:element name="lastModifiedBy" minOccurs="0" maxOccurs="1" type="xsd:string"/>
+        <xsd:element ref="dcterms:modified" minOccurs="0" maxOccurs="1"/>
+        <xsd:element name="contentStatus" minOccurs="0" maxOccurs="1" type="xsd:string"/>
+      </xsd:all>
+    </xsd:complexType>
+  </xsd:schema>
+  <xs:schema xmlns:pc="http://schemas.microsoft.com/office/infopath/2007/PartnerControls" xmlns:xs="http://www.w3.org/2001/XMLSchema" targetNamespace="http://schemas.microsoft.com/office/infopath/2007/PartnerControls" elementFormDefault="qualified" attributeFormDefault="unqualified">
+    <xs:element name="Person">
+      <xs:complexType>
+        <xs:sequence>
+          <xs:element ref="pc:DisplayName" minOccurs="0"/>
+          <xs:element ref="pc:AccountId" minOccurs="0"/>
+          <xs:element ref="pc:AccountType" minOccurs="0"/>
+        </xs:sequence>
+      </xs:complexType>
+    </xs:element>
+    <xs:element name="DisplayName" type="xs:string"/>
+    <xs:element name="AccountId" type="xs:string"/>
+    <xs:element name="AccountType" type="xs:string"/>
+    <xs:element name="BDCAssociatedEntity">
+      <xs:complexType>
+        <xs:sequence>
+          <xs:element ref="pc:BDCEntity" minOccurs="0" maxOccurs="unbounded"/>
+        </xs:sequence>
+        <xs:attribute ref="pc:EntityNamespace"/>
+        <xs:attribute ref="pc:EntityName"/>
+        <xs:attribute ref="pc:SystemInstanceName"/>
+        <xs:attribute ref="pc:AssociationName"/>
+      </xs:complexType>
+    </xs:element>
+    <xs:attribute name="EntityNamespace" type="xs:string"/>
+    <xs:attribute name="EntityName" type="xs:string"/>
+    <xs:attribute name="SystemInstanceName" type="xs:string"/>
+    <xs:attribute name="AssociationName" type="xs:string"/>
+    <xs:element name="BDCEntity">
+      <xs:complexType>
+        <xs:sequence>
+          <xs:element ref="pc:EntityDisplayName" minOccurs="0"/>
+          <xs:element ref="pc:EntityInstanceReference" minOccurs="0"/>
+          <xs:element ref="pc:EntityId1" minOccurs="0"/>
+          <xs:element ref="pc:EntityId2" minOccurs="0"/>
+          <xs:element ref="pc:EntityId3" minOccurs="0"/>
+          <xs:element ref="pc:EntityId4" minOccurs="0"/>
+          <xs:element ref="pc:EntityId5" minOccurs="0"/>
+        </xs:sequence>
+      </xs:complexType>
+    </xs:element>
+    <xs:element name="EntityDisplayName" type="xs:string"/>
+    <xs:element name="EntityInstanceReference" type="xs:string"/>
+    <xs:element name="EntityId1" type="xs:string"/>
+    <xs:element name="EntityId2" type="xs:string"/>
+    <xs:element name="EntityId3" type="xs:string"/>
+    <xs:element name="EntityId4" type="xs:string"/>
+    <xs:element name="EntityId5" type="xs:string"/>
+    <xs:element name="Terms">
+      <xs:complexType>
+        <xs:sequence>
+          <xs:element ref="pc:TermInfo" minOccurs="0" maxOccurs="unbounded"/>
+        </xs:sequence>
+      </xs:complexType>
+    </xs:element>
+    <xs:element name="TermInfo">
+      <xs:complexType>
+        <xs:sequence>
+          <xs:element ref="pc:TermName" minOccurs="0"/>
+          <xs:element ref="pc:TermId" minOccurs="0"/>
+        </xs:sequence>
+      </xs:complexType>
+    </xs:element>
+    <xs:element name="TermName" type="xs:string"/>
+    <xs:element name="TermId" type="xs:string"/>
+  </xs:schema>
+</ct:contentTypeSchema>
+</file>
+
+<file path=customXml/itemProps1.xml><?xml version="1.0" encoding="utf-8"?>
+<ds:datastoreItem xmlns:ds="http://schemas.openxmlformats.org/officeDocument/2006/customXml" ds:itemID="{485A9AAC-B8B7-4573-862E-1424322F408F}">
+  <ds:schemaRefs>
+    <ds:schemaRef ds:uri="92790b02-1a8a-46fa-8082-3f41ada6b8e7"/>
+    <ds:schemaRef ds:uri="http://purl.org/dc/terms/"/>
+    <ds:schemaRef ds:uri="http://schemas.openxmlformats.org/package/2006/metadata/core-properties"/>
+    <ds:schemaRef ds:uri="http://purl.org/dc/dcmitype/"/>
+    <ds:schemaRef ds:uri="http://schemas.microsoft.com/office/infopath/2007/PartnerControls"/>
+    <ds:schemaRef ds:uri="http://purl.org/dc/elements/1.1/"/>
+    <ds:schemaRef ds:uri="http://schemas.microsoft.com/office/2006/documentManagement/types"/>
+    <ds:schemaRef ds:uri="http://schemas.microsoft.com/office/2006/metadata/properties"/>
+    <ds:schemaRef ds:uri="http://www.w3.org/XML/1998/namespace"/>
+  </ds:schemaRefs>
+</ds:datastoreItem>
+</file>
+
+<file path=customXml/itemProps2.xml><?xml version="1.0" encoding="utf-8"?>
+<ds:datastoreItem xmlns:ds="http://schemas.openxmlformats.org/officeDocument/2006/customXml" ds:itemID="{8E1554DB-A086-4706-AED5-05FE33FE281C}">
+  <ds:schemaRefs>
+    <ds:schemaRef ds:uri="http://schemas.microsoft.com/sharepoint/v3/contenttype/forms"/>
+  </ds:schemaRefs>
+</ds:datastoreItem>
+</file>
+
+<file path=customXml/itemProps3.xml><?xml version="1.0" encoding="utf-8"?>
+<ds:datastoreItem xmlns:ds="http://schemas.openxmlformats.org/officeDocument/2006/customXml" ds:itemID="{CBC8716F-FF4C-4D3E-82F7-50EBCEEA6E95}">
+  <ds:schemaRefs>
+    <ds:schemaRef ds:uri="http://schemas.microsoft.com/office/2006/metadata/contentType"/>
+    <ds:schemaRef ds:uri="http://schemas.microsoft.com/office/2006/metadata/properties/metaAttributes"/>
+    <ds:schemaRef ds:uri="http://www.w3.org/2001/XMLSchema"/>
+    <ds:schemaRef ds:uri="http://schemas.microsoft.com/office/2006/metadata/properties"/>
+    <ds:schemaRef ds:uri="92790b02-1a8a-46fa-8082-3f41ada6b8e7"/>
+    <ds:schemaRef ds:uri="http://schemas.microsoft.com/office/2006/documentManagement/types"/>
+    <ds:schemaRef ds:uri="http://schemas.microsoft.com/office/infopath/2007/PartnerControls"/>
+    <ds:schemaRef ds:uri="http://schemas.openxmlformats.org/package/2006/metadata/core-properties"/>
+    <ds:schemaRef ds:uri="http://purl.org/dc/elements/1.1/"/>
+    <ds:schemaRef ds:uri="http://purl.org/dc/terms/"/>
+    <ds:schemaRef ds:uri="http://schemas.microsoft.com/internal/obd"/>
+  </ds:schemaRefs>
+</ds:datastoreItem>
 </file>
</xml_diff>